<commit_message>
Fixed error on ListCommand not accepting "list"
</commit_message>
<xml_diff>
--- a/docs/diagrams/ModelComponentClassDiagram.pptx
+++ b/docs/diagrams/ModelComponentClassDiagram.pptx
@@ -208,7 +208,7 @@
           <a:p>
             <a:fld id="{F5CC4B3F-88C1-4FFA-B1B6-F41C21DC6924}" type="datetimeFigureOut">
               <a:rPr lang="en-US" smtClean="0"/>
-              <a:t>3/17/2017</a:t>
+              <a:t>3/20/2017</a:t>
             </a:fld>
             <a:endParaRPr lang="en-US"/>
           </a:p>
@@ -657,7 +657,7 @@
           <a:p>
             <a:fld id="{78C97017-6FC3-485B-9764-EAC9E56C1D49}" type="datetimeFigureOut">
               <a:rPr lang="en-US" smtClean="0"/>
-              <a:t>3/17/2017</a:t>
+              <a:t>3/20/2017</a:t>
             </a:fld>
             <a:endParaRPr lang="en-US"/>
           </a:p>
@@ -827,7 +827,7 @@
           <a:p>
             <a:fld id="{78C97017-6FC3-485B-9764-EAC9E56C1D49}" type="datetimeFigureOut">
               <a:rPr lang="en-US" smtClean="0"/>
-              <a:t>3/17/2017</a:t>
+              <a:t>3/20/2017</a:t>
             </a:fld>
             <a:endParaRPr lang="en-US"/>
           </a:p>
@@ -1007,7 +1007,7 @@
           <a:p>
             <a:fld id="{78C97017-6FC3-485B-9764-EAC9E56C1D49}" type="datetimeFigureOut">
               <a:rPr lang="en-US" smtClean="0"/>
-              <a:t>3/17/2017</a:t>
+              <a:t>3/20/2017</a:t>
             </a:fld>
             <a:endParaRPr lang="en-US"/>
           </a:p>
@@ -1177,7 +1177,7 @@
           <a:p>
             <a:fld id="{78C97017-6FC3-485B-9764-EAC9E56C1D49}" type="datetimeFigureOut">
               <a:rPr lang="en-US" smtClean="0"/>
-              <a:t>3/17/2017</a:t>
+              <a:t>3/20/2017</a:t>
             </a:fld>
             <a:endParaRPr lang="en-US"/>
           </a:p>
@@ -1423,7 +1423,7 @@
           <a:p>
             <a:fld id="{78C97017-6FC3-485B-9764-EAC9E56C1D49}" type="datetimeFigureOut">
               <a:rPr lang="en-US" smtClean="0"/>
-              <a:t>3/17/2017</a:t>
+              <a:t>3/20/2017</a:t>
             </a:fld>
             <a:endParaRPr lang="en-US"/>
           </a:p>
@@ -1711,7 +1711,7 @@
           <a:p>
             <a:fld id="{78C97017-6FC3-485B-9764-EAC9E56C1D49}" type="datetimeFigureOut">
               <a:rPr lang="en-US" smtClean="0"/>
-              <a:t>3/17/2017</a:t>
+              <a:t>3/20/2017</a:t>
             </a:fld>
             <a:endParaRPr lang="en-US"/>
           </a:p>
@@ -2133,7 +2133,7 @@
           <a:p>
             <a:fld id="{78C97017-6FC3-485B-9764-EAC9E56C1D49}" type="datetimeFigureOut">
               <a:rPr lang="en-US" smtClean="0"/>
-              <a:t>3/17/2017</a:t>
+              <a:t>3/20/2017</a:t>
             </a:fld>
             <a:endParaRPr lang="en-US"/>
           </a:p>
@@ -2251,7 +2251,7 @@
           <a:p>
             <a:fld id="{78C97017-6FC3-485B-9764-EAC9E56C1D49}" type="datetimeFigureOut">
               <a:rPr lang="en-US" smtClean="0"/>
-              <a:t>3/17/2017</a:t>
+              <a:t>3/20/2017</a:t>
             </a:fld>
             <a:endParaRPr lang="en-US"/>
           </a:p>
@@ -2346,7 +2346,7 @@
           <a:p>
             <a:fld id="{78C97017-6FC3-485B-9764-EAC9E56C1D49}" type="datetimeFigureOut">
               <a:rPr lang="en-US" smtClean="0"/>
-              <a:t>3/17/2017</a:t>
+              <a:t>3/20/2017</a:t>
             </a:fld>
             <a:endParaRPr lang="en-US"/>
           </a:p>
@@ -2623,7 +2623,7 @@
           <a:p>
             <a:fld id="{78C97017-6FC3-485B-9764-EAC9E56C1D49}" type="datetimeFigureOut">
               <a:rPr lang="en-US" smtClean="0"/>
-              <a:t>3/17/2017</a:t>
+              <a:t>3/20/2017</a:t>
             </a:fld>
             <a:endParaRPr lang="en-US"/>
           </a:p>
@@ -2876,7 +2876,7 @@
           <a:p>
             <a:fld id="{78C97017-6FC3-485B-9764-EAC9E56C1D49}" type="datetimeFigureOut">
               <a:rPr lang="en-US" smtClean="0"/>
-              <a:t>3/17/2017</a:t>
+              <a:t>3/20/2017</a:t>
             </a:fld>
             <a:endParaRPr lang="en-US"/>
           </a:p>
@@ -3089,7 +3089,7 @@
           <a:p>
             <a:fld id="{78C97017-6FC3-485B-9764-EAC9E56C1D49}" type="datetimeFigureOut">
               <a:rPr lang="en-US" smtClean="0"/>
-              <a:t>3/17/2017</a:t>
+              <a:t>3/20/2017</a:t>
             </a:fld>
             <a:endParaRPr lang="en-US"/>
           </a:p>
@@ -4112,7 +4112,7 @@
                   <a:srgbClr val="7030A0"/>
                 </a:solidFill>
               </a:rPr>
-              <a:t>AddressBook</a:t>
+              <a:t>TaskManager</a:t>
             </a:r>
             <a:endParaRPr lang="en-SG" sz="1050" dirty="0">
               <a:solidFill>

</xml_diff>

<commit_message>
changed model class diagram in development guide
</commit_message>
<xml_diff>
--- a/docs/diagrams/ModelComponentClassDiagram.pptx
+++ b/docs/diagrams/ModelComponentClassDiagram.pptx
@@ -208,7 +208,7 @@
           <a:p>
             <a:fld id="{F5CC4B3F-88C1-4FFA-B1B6-F41C21DC6924}" type="datetimeFigureOut">
               <a:rPr lang="en-US" smtClean="0"/>
-              <a:t>3/20/2017</a:t>
+              <a:t>4/5/2017</a:t>
             </a:fld>
             <a:endParaRPr lang="en-US"/>
           </a:p>
@@ -657,7 +657,7 @@
           <a:p>
             <a:fld id="{78C97017-6FC3-485B-9764-EAC9E56C1D49}" type="datetimeFigureOut">
               <a:rPr lang="en-US" smtClean="0"/>
-              <a:t>3/20/2017</a:t>
+              <a:t>4/5/2017</a:t>
             </a:fld>
             <a:endParaRPr lang="en-US"/>
           </a:p>
@@ -827,7 +827,7 @@
           <a:p>
             <a:fld id="{78C97017-6FC3-485B-9764-EAC9E56C1D49}" type="datetimeFigureOut">
               <a:rPr lang="en-US" smtClean="0"/>
-              <a:t>3/20/2017</a:t>
+              <a:t>4/5/2017</a:t>
             </a:fld>
             <a:endParaRPr lang="en-US"/>
           </a:p>
@@ -1007,7 +1007,7 @@
           <a:p>
             <a:fld id="{78C97017-6FC3-485B-9764-EAC9E56C1D49}" type="datetimeFigureOut">
               <a:rPr lang="en-US" smtClean="0"/>
-              <a:t>3/20/2017</a:t>
+              <a:t>4/5/2017</a:t>
             </a:fld>
             <a:endParaRPr lang="en-US"/>
           </a:p>
@@ -1177,7 +1177,7 @@
           <a:p>
             <a:fld id="{78C97017-6FC3-485B-9764-EAC9E56C1D49}" type="datetimeFigureOut">
               <a:rPr lang="en-US" smtClean="0"/>
-              <a:t>3/20/2017</a:t>
+              <a:t>4/5/2017</a:t>
             </a:fld>
             <a:endParaRPr lang="en-US"/>
           </a:p>
@@ -1423,7 +1423,7 @@
           <a:p>
             <a:fld id="{78C97017-6FC3-485B-9764-EAC9E56C1D49}" type="datetimeFigureOut">
               <a:rPr lang="en-US" smtClean="0"/>
-              <a:t>3/20/2017</a:t>
+              <a:t>4/5/2017</a:t>
             </a:fld>
             <a:endParaRPr lang="en-US"/>
           </a:p>
@@ -1711,7 +1711,7 @@
           <a:p>
             <a:fld id="{78C97017-6FC3-485B-9764-EAC9E56C1D49}" type="datetimeFigureOut">
               <a:rPr lang="en-US" smtClean="0"/>
-              <a:t>3/20/2017</a:t>
+              <a:t>4/5/2017</a:t>
             </a:fld>
             <a:endParaRPr lang="en-US"/>
           </a:p>
@@ -2133,7 +2133,7 @@
           <a:p>
             <a:fld id="{78C97017-6FC3-485B-9764-EAC9E56C1D49}" type="datetimeFigureOut">
               <a:rPr lang="en-US" smtClean="0"/>
-              <a:t>3/20/2017</a:t>
+              <a:t>4/5/2017</a:t>
             </a:fld>
             <a:endParaRPr lang="en-US"/>
           </a:p>
@@ -2251,7 +2251,7 @@
           <a:p>
             <a:fld id="{78C97017-6FC3-485B-9764-EAC9E56C1D49}" type="datetimeFigureOut">
               <a:rPr lang="en-US" smtClean="0"/>
-              <a:t>3/20/2017</a:t>
+              <a:t>4/5/2017</a:t>
             </a:fld>
             <a:endParaRPr lang="en-US"/>
           </a:p>
@@ -2346,7 +2346,7 @@
           <a:p>
             <a:fld id="{78C97017-6FC3-485B-9764-EAC9E56C1D49}" type="datetimeFigureOut">
               <a:rPr lang="en-US" smtClean="0"/>
-              <a:t>3/20/2017</a:t>
+              <a:t>4/5/2017</a:t>
             </a:fld>
             <a:endParaRPr lang="en-US"/>
           </a:p>
@@ -2623,7 +2623,7 @@
           <a:p>
             <a:fld id="{78C97017-6FC3-485B-9764-EAC9E56C1D49}" type="datetimeFigureOut">
               <a:rPr lang="en-US" smtClean="0"/>
-              <a:t>3/20/2017</a:t>
+              <a:t>4/5/2017</a:t>
             </a:fld>
             <a:endParaRPr lang="en-US"/>
           </a:p>
@@ -2876,7 +2876,7 @@
           <a:p>
             <a:fld id="{78C97017-6FC3-485B-9764-EAC9E56C1D49}" type="datetimeFigureOut">
               <a:rPr lang="en-US" smtClean="0"/>
-              <a:t>3/20/2017</a:t>
+              <a:t>4/5/2017</a:t>
             </a:fld>
             <a:endParaRPr lang="en-US"/>
           </a:p>
@@ -3089,7 +3089,7 @@
           <a:p>
             <a:fld id="{78C97017-6FC3-485B-9764-EAC9E56C1D49}" type="datetimeFigureOut">
               <a:rPr lang="en-US" smtClean="0"/>
-              <a:t>3/20/2017</a:t>
+              <a:t>4/5/2017</a:t>
             </a:fld>
             <a:endParaRPr lang="en-US"/>
           </a:p>
@@ -3473,7 +3473,7 @@
         <p:spPr>
           <a:xfrm>
             <a:off x="1119865" y="1727200"/>
-            <a:ext cx="7490735" cy="2997200"/>
+            <a:ext cx="7490735" cy="3606800"/>
           </a:xfrm>
           <a:prstGeom prst="roundRect">
             <a:avLst>
@@ -3527,14 +3527,14 @@
       </p:sp>
       <p:sp>
         <p:nvSpPr>
-          <p:cNvPr id="2" name="Rectangle 8"/>
+          <p:cNvPr id="9" name="Rectangle 62"/>
           <p:cNvSpPr/>
           <p:nvPr/>
         </p:nvSpPr>
         <p:spPr>
-          <a:xfrm>
-            <a:off x="2877180" y="3158440"/>
-            <a:ext cx="1093635" cy="346760"/>
+          <a:xfrm rot="16200000">
+            <a:off x="1459106" y="3093544"/>
+            <a:ext cx="1543350" cy="346760"/>
           </a:xfrm>
           <a:prstGeom prst="rect">
             <a:avLst/>
@@ -3574,65 +3574,6 @@
                   <a:schemeClr val="bg1"/>
                 </a:solidFill>
               </a:rPr>
-              <a:t>UserPref</a:t>
-            </a:r>
-            <a:endParaRPr lang="en-SG" sz="1050" dirty="0">
-              <a:solidFill>
-                <a:schemeClr val="bg1"/>
-              </a:solidFill>
-            </a:endParaRPr>
-          </a:p>
-        </p:txBody>
-      </p:sp>
-      <p:sp>
-        <p:nvSpPr>
-          <p:cNvPr id="9" name="Rectangle 62"/>
-          <p:cNvSpPr/>
-          <p:nvPr/>
-        </p:nvSpPr>
-        <p:spPr>
-          <a:xfrm rot="16200000">
-            <a:off x="1683963" y="2868687"/>
-            <a:ext cx="1093635" cy="346760"/>
-          </a:xfrm>
-          <a:prstGeom prst="rect">
-            <a:avLst/>
-          </a:prstGeom>
-          <a:solidFill>
-            <a:srgbClr val="7030A0"/>
-          </a:solidFill>
-          <a:ln w="19050">
-            <a:solidFill>
-              <a:srgbClr val="7030A0"/>
-            </a:solidFill>
-          </a:ln>
-          <a:effectLst/>
-        </p:spPr>
-        <p:style>
-          <a:lnRef idx="1">
-            <a:schemeClr val="accent2"/>
-          </a:lnRef>
-          <a:fillRef idx="2">
-            <a:schemeClr val="accent2"/>
-          </a:fillRef>
-          <a:effectRef idx="1">
-            <a:schemeClr val="accent2"/>
-          </a:effectRef>
-          <a:fontRef idx="minor">
-            <a:schemeClr val="dk1"/>
-          </a:fontRef>
-        </p:style>
-        <p:txBody>
-          <a:bodyPr rtlCol="0" anchor="ctr"/>
-          <a:lstStyle/>
-          <a:p>
-            <a:pPr algn="ctr"/>
-            <a:r>
-              <a:rPr lang="en-US" sz="1050" dirty="0" err="1" smtClean="0">
-                <a:solidFill>
-                  <a:schemeClr val="bg1"/>
-                </a:solidFill>
-              </a:rPr>
               <a:t>ModelManager</a:t>
             </a:r>
             <a:endParaRPr lang="en-SG" sz="1050" dirty="0">
@@ -3653,8 +3594,8 @@
         </p:nvCxnSpPr>
         <p:spPr>
           <a:xfrm flipV="1">
-            <a:off x="6477000" y="3194131"/>
-            <a:ext cx="95385" cy="416514"/>
+            <a:off x="6477000" y="3058412"/>
+            <a:ext cx="91180" cy="552233"/>
           </a:xfrm>
           <a:prstGeom prst="bentConnector2">
             <a:avLst/>
@@ -3689,18 +3630,18 @@
           <p:cNvPr id="107" name="Elbow Connector 106"/>
           <p:cNvCxnSpPr>
             <a:stCxn id="9" idx="1"/>
+            <a:endCxn id="62" idx="2"/>
           </p:cNvCxnSpPr>
           <p:nvPr/>
         </p:nvCxnSpPr>
         <p:spPr>
           <a:xfrm rot="5400000" flipH="1" flipV="1">
-            <a:off x="4360065" y="1080909"/>
-            <a:ext cx="378691" cy="4637261"/>
-          </a:xfrm>
-          <a:prstGeom prst="bentConnector4">
+            <a:off x="3953975" y="1324805"/>
+            <a:ext cx="990599" cy="4436989"/>
+          </a:xfrm>
+          <a:prstGeom prst="bentConnector3">
             <a:avLst>
-              <a:gd name="adj1" fmla="val -101829"/>
-              <a:gd name="adj2" fmla="val 99976"/>
+              <a:gd name="adj1" fmla="val -63642"/>
             </a:avLst>
           </a:prstGeom>
           <a:ln w="19050">
@@ -3845,47 +3786,6 @@
           </a:p>
         </p:txBody>
       </p:sp>
-      <p:cxnSp>
-        <p:nvCxnSpPr>
-          <p:cNvPr id="58" name="Straight Arrow Connector 57"/>
-          <p:cNvCxnSpPr>
-            <a:stCxn id="42" idx="3"/>
-            <a:endCxn id="2" idx="1"/>
-          </p:cNvCxnSpPr>
-          <p:nvPr/>
-        </p:nvCxnSpPr>
-        <p:spPr>
-          <a:xfrm>
-            <a:off x="2656370" y="3326536"/>
-            <a:ext cx="220810" cy="5284"/>
-          </a:xfrm>
-          <a:prstGeom prst="straightConnector1">
-            <a:avLst/>
-          </a:prstGeom>
-          <a:ln w="19050">
-            <a:solidFill>
-              <a:srgbClr val="7030A0"/>
-            </a:solidFill>
-            <a:headEnd type="none" w="med" len="med"/>
-            <a:tailEnd type="arrow" w="med" len="med"/>
-          </a:ln>
-          <a:effectLst/>
-        </p:spPr>
-        <p:style>
-          <a:lnRef idx="1">
-            <a:schemeClr val="accent2"/>
-          </a:lnRef>
-          <a:fillRef idx="2">
-            <a:schemeClr val="accent2"/>
-          </a:fillRef>
-          <a:effectRef idx="1">
-            <a:schemeClr val="accent2"/>
-          </a:effectRef>
-          <a:fontRef idx="minor">
-            <a:schemeClr val="dk1"/>
-          </a:fontRef>
-        </p:style>
-      </p:cxnSp>
       <p:sp>
         <p:nvSpPr>
           <p:cNvPr id="71" name="Isosceles Triangle 102"/>
@@ -4023,19 +3923,77 @@
       </p:cxnSp>
       <p:sp>
         <p:nvSpPr>
-          <p:cNvPr id="42" name="Flowchart: Decision 96"/>
+          <p:cNvPr id="49" name="Rectangle 8"/>
           <p:cNvSpPr/>
           <p:nvPr/>
         </p:nvSpPr>
         <p:spPr>
           <a:xfrm>
-            <a:off x="2420322" y="3239846"/>
+            <a:off x="4487017" y="2701240"/>
+            <a:ext cx="1156969" cy="346760"/>
+          </a:xfrm>
+          <a:prstGeom prst="rect">
+            <a:avLst/>
+          </a:prstGeom>
+          <a:ln w="19050">
+            <a:solidFill>
+              <a:srgbClr val="7030A0"/>
+            </a:solidFill>
+          </a:ln>
+          <a:effectLst/>
+        </p:spPr>
+        <p:style>
+          <a:lnRef idx="1">
+            <a:schemeClr val="accent4"/>
+          </a:lnRef>
+          <a:fillRef idx="2">
+            <a:schemeClr val="accent4"/>
+          </a:fillRef>
+          <a:effectRef idx="1">
+            <a:schemeClr val="accent4"/>
+          </a:effectRef>
+          <a:fontRef idx="minor">
+            <a:schemeClr val="dk1"/>
+          </a:fontRef>
+        </p:style>
+        <p:txBody>
+          <a:bodyPr rtlCol="0" anchor="ctr"/>
+          <a:lstStyle/>
+          <a:p>
+            <a:pPr algn="ctr"/>
+            <a:r>
+              <a:rPr lang="en-US" sz="1050" dirty="0" err="1" smtClean="0">
+                <a:solidFill>
+                  <a:srgbClr val="7030A0"/>
+                </a:solidFill>
+              </a:rPr>
+              <a:t>UniqueTaskList</a:t>
+            </a:r>
+            <a:endParaRPr lang="en-SG" sz="1050" dirty="0">
+              <a:solidFill>
+                <a:srgbClr val="7030A0"/>
+              </a:solidFill>
+            </a:endParaRPr>
+          </a:p>
+        </p:txBody>
+      </p:sp>
+      <p:sp>
+        <p:nvSpPr>
+          <p:cNvPr id="51" name="Flowchart: Decision 96"/>
+          <p:cNvSpPr/>
+          <p:nvPr/>
+        </p:nvSpPr>
+        <p:spPr>
+          <a:xfrm>
+            <a:off x="3984303" y="2514600"/>
             <a:ext cx="236048" cy="173380"/>
           </a:xfrm>
           <a:prstGeom prst="flowChartDecision">
             <a:avLst/>
           </a:prstGeom>
-          <a:noFill/>
+          <a:solidFill>
+            <a:srgbClr val="7030A0"/>
+          </a:solidFill>
           <a:ln w="19050">
             <a:solidFill>
               <a:srgbClr val="7030A0"/>
@@ -4066,77 +4024,21 @@
           </a:p>
         </p:txBody>
       </p:sp>
-      <p:sp>
-        <p:nvSpPr>
-          <p:cNvPr id="46" name="Rectangle 8"/>
-          <p:cNvSpPr/>
-          <p:nvPr/>
-        </p:nvSpPr>
-        <p:spPr>
-          <a:xfrm>
-            <a:off x="2879490" y="2627420"/>
-            <a:ext cx="1093635" cy="346760"/>
-          </a:xfrm>
-          <a:prstGeom prst="rect">
-            <a:avLst/>
-          </a:prstGeom>
-          <a:ln w="19050">
-            <a:solidFill>
-              <a:srgbClr val="7030A0"/>
-            </a:solidFill>
-          </a:ln>
-          <a:effectLst/>
-        </p:spPr>
-        <p:style>
-          <a:lnRef idx="1">
-            <a:schemeClr val="accent4"/>
-          </a:lnRef>
-          <a:fillRef idx="2">
-            <a:schemeClr val="accent4"/>
-          </a:fillRef>
-          <a:effectRef idx="1">
-            <a:schemeClr val="accent4"/>
-          </a:effectRef>
-          <a:fontRef idx="minor">
-            <a:schemeClr val="dk1"/>
-          </a:fontRef>
-        </p:style>
-        <p:txBody>
-          <a:bodyPr rtlCol="0" anchor="ctr"/>
-          <a:lstStyle/>
-          <a:p>
-            <a:pPr algn="ctr"/>
-            <a:r>
-              <a:rPr lang="en-US" sz="1050" dirty="0" err="1" smtClean="0">
-                <a:solidFill>
-                  <a:srgbClr val="7030A0"/>
-                </a:solidFill>
-              </a:rPr>
-              <a:t>TaskManager</a:t>
-            </a:r>
-            <a:endParaRPr lang="en-SG" sz="1050" dirty="0">
-              <a:solidFill>
-                <a:srgbClr val="7030A0"/>
-              </a:solidFill>
-            </a:endParaRPr>
-          </a:p>
-        </p:txBody>
-      </p:sp>
       <p:cxnSp>
         <p:nvCxnSpPr>
-          <p:cNvPr id="47" name="Straight Arrow Connector 46"/>
+          <p:cNvPr id="30" name="Elbow Connector 29"/>
           <p:cNvCxnSpPr>
-            <a:stCxn id="48" idx="3"/>
-            <a:endCxn id="46" idx="1"/>
+            <a:stCxn id="51" idx="3"/>
+            <a:endCxn id="49" idx="1"/>
           </p:cNvCxnSpPr>
           <p:nvPr/>
         </p:nvCxnSpPr>
         <p:spPr>
           <a:xfrm>
-            <a:off x="2658680" y="2795516"/>
-            <a:ext cx="220810" cy="5284"/>
-          </a:xfrm>
-          <a:prstGeom prst="straightConnector1">
+            <a:off x="4220351" y="2601290"/>
+            <a:ext cx="266666" cy="273330"/>
+          </a:xfrm>
+          <a:prstGeom prst="bentConnector3">
             <a:avLst/>
           </a:prstGeom>
           <a:ln w="19050">
@@ -4165,58 +4067,13 @@
       </p:cxnSp>
       <p:sp>
         <p:nvSpPr>
-          <p:cNvPr id="48" name="Flowchart: Decision 96"/>
+          <p:cNvPr id="57" name="Rectangle 8"/>
           <p:cNvSpPr/>
           <p:nvPr/>
         </p:nvSpPr>
         <p:spPr>
           <a:xfrm>
-            <a:off x="2422632" y="2708826"/>
-            <a:ext cx="236048" cy="173380"/>
-          </a:xfrm>
-          <a:prstGeom prst="flowChartDecision">
-            <a:avLst/>
-          </a:prstGeom>
-          <a:noFill/>
-          <a:ln w="19050">
-            <a:solidFill>
-              <a:srgbClr val="7030A0"/>
-            </a:solidFill>
-          </a:ln>
-          <a:effectLst/>
-        </p:spPr>
-        <p:style>
-          <a:lnRef idx="1">
-            <a:schemeClr val="accent6"/>
-          </a:lnRef>
-          <a:fillRef idx="2">
-            <a:schemeClr val="accent6"/>
-          </a:fillRef>
-          <a:effectRef idx="1">
-            <a:schemeClr val="accent6"/>
-          </a:effectRef>
-          <a:fontRef idx="minor">
-            <a:schemeClr val="dk1"/>
-          </a:fontRef>
-        </p:style>
-        <p:txBody>
-          <a:bodyPr rtlCol="0" anchor="ctr"/>
-          <a:lstStyle/>
-          <a:p>
-            <a:pPr algn="ctr"/>
-            <a:endParaRPr lang="en-US" sz="1050"/>
-          </a:p>
-        </p:txBody>
-      </p:sp>
-      <p:sp>
-        <p:nvSpPr>
-          <p:cNvPr id="49" name="Rectangle 8"/>
-          <p:cNvSpPr/>
-          <p:nvPr/>
-        </p:nvSpPr>
-        <p:spPr>
-          <a:xfrm>
-            <a:off x="4487017" y="2847371"/>
+            <a:off x="4477328" y="2280569"/>
             <a:ext cx="1156969" cy="346760"/>
           </a:xfrm>
           <a:prstGeom prst="rect">
@@ -4254,7 +4111,7 @@
                   <a:srgbClr val="7030A0"/>
                 </a:solidFill>
               </a:rPr>
-              <a:t>UniqueTaskList</a:t>
+              <a:t>UniqueTagList</a:t>
             </a:r>
             <a:endParaRPr lang="en-SG" sz="1050" dirty="0">
               <a:solidFill>
@@ -4264,69 +4121,24 @@
           </a:p>
         </p:txBody>
       </p:sp>
-      <p:sp>
-        <p:nvSpPr>
-          <p:cNvPr id="51" name="Flowchart: Decision 96"/>
-          <p:cNvSpPr/>
-          <p:nvPr/>
-        </p:nvSpPr>
-        <p:spPr>
-          <a:xfrm>
-            <a:off x="3984303" y="2673991"/>
-            <a:ext cx="236048" cy="173380"/>
-          </a:xfrm>
-          <a:prstGeom prst="flowChartDecision">
-            <a:avLst/>
-          </a:prstGeom>
-          <a:solidFill>
-            <a:srgbClr val="7030A0"/>
-          </a:solidFill>
-          <a:ln w="19050">
-            <a:solidFill>
-              <a:srgbClr val="7030A0"/>
-            </a:solidFill>
-          </a:ln>
-          <a:effectLst/>
-        </p:spPr>
-        <p:style>
-          <a:lnRef idx="1">
-            <a:schemeClr val="accent6"/>
-          </a:lnRef>
-          <a:fillRef idx="2">
-            <a:schemeClr val="accent6"/>
-          </a:fillRef>
-          <a:effectRef idx="1">
-            <a:schemeClr val="accent6"/>
-          </a:effectRef>
-          <a:fontRef idx="minor">
-            <a:schemeClr val="dk1"/>
-          </a:fontRef>
-        </p:style>
-        <p:txBody>
-          <a:bodyPr rtlCol="0" anchor="ctr"/>
-          <a:lstStyle/>
-          <a:p>
-            <a:pPr algn="ctr"/>
-            <a:endParaRPr lang="en-US" sz="1050"/>
-          </a:p>
-        </p:txBody>
-      </p:sp>
       <p:cxnSp>
         <p:nvCxnSpPr>
-          <p:cNvPr id="30" name="Elbow Connector 29"/>
+          <p:cNvPr id="59" name="Elbow Connector 58"/>
           <p:cNvCxnSpPr>
             <a:stCxn id="51" idx="3"/>
-            <a:endCxn id="49" idx="1"/>
+            <a:endCxn id="57" idx="1"/>
           </p:cNvCxnSpPr>
           <p:nvPr/>
         </p:nvCxnSpPr>
         <p:spPr>
-          <a:xfrm>
-            <a:off x="4220351" y="2760681"/>
-            <a:ext cx="266666" cy="260070"/>
+          <a:xfrm flipV="1">
+            <a:off x="4220351" y="2453949"/>
+            <a:ext cx="256977" cy="147341"/>
           </a:xfrm>
           <a:prstGeom prst="bentConnector3">
-            <a:avLst/>
+            <a:avLst>
+              <a:gd name="adj1" fmla="val 50000"/>
+            </a:avLst>
           </a:prstGeom>
           <a:ln w="19050">
             <a:solidFill>
@@ -4354,14 +4166,14 @@
       </p:cxnSp>
       <p:sp>
         <p:nvSpPr>
-          <p:cNvPr id="57" name="Rectangle 8"/>
+          <p:cNvPr id="62" name="Rectangle 8"/>
           <p:cNvSpPr/>
           <p:nvPr/>
         </p:nvSpPr>
         <p:spPr>
           <a:xfrm>
-            <a:off x="4477328" y="2280569"/>
-            <a:ext cx="1156969" cy="346760"/>
+            <a:off x="6313677" y="2701240"/>
+            <a:ext cx="708186" cy="346760"/>
           </a:xfrm>
           <a:prstGeom prst="rect">
             <a:avLst/>
@@ -4393,12 +4205,12 @@
           <a:p>
             <a:pPr algn="ctr"/>
             <a:r>
-              <a:rPr lang="en-US" sz="1050" dirty="0" err="1" smtClean="0">
+              <a:rPr lang="en-US" sz="1050" dirty="0" smtClean="0">
                 <a:solidFill>
                   <a:srgbClr val="7030A0"/>
                 </a:solidFill>
               </a:rPr>
-              <a:t>UniqueTagList</a:t>
+              <a:t>Task</a:t>
             </a:r>
             <a:endParaRPr lang="en-SG" sz="1050" dirty="0">
               <a:solidFill>
@@ -4408,24 +4220,64 @@
           </a:p>
         </p:txBody>
       </p:sp>
+      <p:sp>
+        <p:nvSpPr>
+          <p:cNvPr id="63" name="Flowchart: Decision 96"/>
+          <p:cNvSpPr/>
+          <p:nvPr/>
+        </p:nvSpPr>
+        <p:spPr>
+          <a:xfrm>
+            <a:off x="5643227" y="2798420"/>
+            <a:ext cx="236048" cy="173380"/>
+          </a:xfrm>
+          <a:prstGeom prst="flowChartDecision">
+            <a:avLst/>
+          </a:prstGeom>
+          <a:noFill/>
+          <a:ln w="19050">
+            <a:solidFill>
+              <a:srgbClr val="7030A0"/>
+            </a:solidFill>
+          </a:ln>
+          <a:effectLst/>
+        </p:spPr>
+        <p:style>
+          <a:lnRef idx="1">
+            <a:schemeClr val="accent6"/>
+          </a:lnRef>
+          <a:fillRef idx="2">
+            <a:schemeClr val="accent6"/>
+          </a:fillRef>
+          <a:effectRef idx="1">
+            <a:schemeClr val="accent6"/>
+          </a:effectRef>
+          <a:fontRef idx="minor">
+            <a:schemeClr val="dk1"/>
+          </a:fontRef>
+        </p:style>
+        <p:txBody>
+          <a:bodyPr rtlCol="0" anchor="ctr"/>
+          <a:lstStyle/>
+          <a:p>
+            <a:pPr algn="ctr"/>
+            <a:endParaRPr lang="en-US" sz="1050"/>
+          </a:p>
+        </p:txBody>
+      </p:sp>
       <p:cxnSp>
         <p:nvCxnSpPr>
-          <p:cNvPr id="59" name="Elbow Connector 58"/>
-          <p:cNvCxnSpPr>
-            <a:stCxn id="51" idx="3"/>
-            <a:endCxn id="57" idx="1"/>
-          </p:cNvCxnSpPr>
+          <p:cNvPr id="64" name="Elbow Connector 63"/>
+          <p:cNvCxnSpPr/>
           <p:nvPr/>
         </p:nvCxnSpPr>
         <p:spPr>
-          <a:xfrm flipV="1">
-            <a:off x="4220351" y="2453949"/>
-            <a:ext cx="256977" cy="306732"/>
+          <a:xfrm>
+            <a:off x="5890198" y="2895600"/>
+            <a:ext cx="434402" cy="777"/>
           </a:xfrm>
           <a:prstGeom prst="bentConnector3">
-            <a:avLst>
-              <a:gd name="adj1" fmla="val 50000"/>
-            </a:avLst>
+            <a:avLst/>
           </a:prstGeom>
           <a:ln w="19050">
             <a:solidFill>
@@ -4453,14 +4305,14 @@
       </p:cxnSp>
       <p:sp>
         <p:nvSpPr>
-          <p:cNvPr id="62" name="Rectangle 8"/>
+          <p:cNvPr id="67" name="Rectangle 8"/>
           <p:cNvSpPr/>
           <p:nvPr/>
         </p:nvSpPr>
         <p:spPr>
           <a:xfrm>
-            <a:off x="6313677" y="2858066"/>
-            <a:ext cx="708186" cy="346760"/>
+            <a:off x="5336105" y="1809332"/>
+            <a:ext cx="483700" cy="346760"/>
           </a:xfrm>
           <a:prstGeom prst="rect">
             <a:avLst/>
@@ -4497,7 +4349,7 @@
                   <a:srgbClr val="7030A0"/>
                 </a:solidFill>
               </a:rPr>
-              <a:t>Task</a:t>
+              <a:t>Tag</a:t>
             </a:r>
             <a:endParaRPr lang="en-SG" sz="1050" dirty="0">
               <a:solidFill>
@@ -4509,13 +4361,13 @@
       </p:sp>
       <p:sp>
         <p:nvSpPr>
-          <p:cNvPr id="63" name="Flowchart: Decision 96"/>
+          <p:cNvPr id="68" name="Flowchart: Decision 96"/>
           <p:cNvSpPr/>
           <p:nvPr/>
         </p:nvSpPr>
         <p:spPr>
-          <a:xfrm>
-            <a:off x="5643227" y="2943979"/>
+          <a:xfrm rot="16200000">
+            <a:off x="4921666" y="2066540"/>
             <a:ext cx="236048" cy="173380"/>
           </a:xfrm>
           <a:prstGeom prst="flowChartDecision">
@@ -4554,19 +4406,19 @@
       </p:sp>
       <p:cxnSp>
         <p:nvCxnSpPr>
-          <p:cNvPr id="64" name="Elbow Connector 63"/>
+          <p:cNvPr id="69" name="Elbow Connector 68"/>
           <p:cNvCxnSpPr>
-            <a:stCxn id="63" idx="3"/>
-            <a:endCxn id="62" idx="1"/>
+            <a:stCxn id="68" idx="3"/>
+            <a:endCxn id="67" idx="1"/>
           </p:cNvCxnSpPr>
           <p:nvPr/>
         </p:nvCxnSpPr>
         <p:spPr>
-          <a:xfrm>
-            <a:off x="5879275" y="3030669"/>
-            <a:ext cx="434402" cy="777"/>
-          </a:xfrm>
-          <a:prstGeom prst="bentConnector3">
+          <a:xfrm rot="5400000" flipH="1" flipV="1">
+            <a:off x="5161650" y="1860752"/>
+            <a:ext cx="52494" cy="296415"/>
+          </a:xfrm>
+          <a:prstGeom prst="bentConnector2">
             <a:avLst/>
           </a:prstGeom>
           <a:ln w="19050">
@@ -4595,14 +4447,14 @@
       </p:cxnSp>
       <p:sp>
         <p:nvSpPr>
-          <p:cNvPr id="67" name="Rectangle 8"/>
+          <p:cNvPr id="72" name="Rectangle 8"/>
           <p:cNvSpPr/>
           <p:nvPr/>
         </p:nvSpPr>
         <p:spPr>
           <a:xfrm>
-            <a:off x="5336105" y="1809332"/>
-            <a:ext cx="483700" cy="346760"/>
+            <a:off x="5128257" y="3429000"/>
+            <a:ext cx="1156969" cy="346760"/>
           </a:xfrm>
           <a:prstGeom prst="rect">
             <a:avLst/>
@@ -4639,7 +4491,22 @@
                   <a:srgbClr val="7030A0"/>
                 </a:solidFill>
               </a:rPr>
-              <a:t>Tag</a:t>
+              <a:t>&lt;&lt;interface&gt;&gt;</a:t>
+            </a:r>
+            <a:br>
+              <a:rPr lang="en-US" sz="1050" dirty="0" smtClean="0">
+                <a:solidFill>
+                  <a:srgbClr val="7030A0"/>
+                </a:solidFill>
+              </a:rPr>
+            </a:br>
+            <a:r>
+              <a:rPr lang="en-US" sz="1050" dirty="0" err="1" smtClean="0">
+                <a:solidFill>
+                  <a:srgbClr val="7030A0"/>
+                </a:solidFill>
+              </a:rPr>
+              <a:t>ReadOnlyTask</a:t>
             </a:r>
             <a:endParaRPr lang="en-SG" sz="1050" dirty="0">
               <a:solidFill>
@@ -4651,19 +4518,77 @@
       </p:sp>
       <p:sp>
         <p:nvSpPr>
-          <p:cNvPr id="68" name="Flowchart: Decision 96"/>
+          <p:cNvPr id="76" name="Rectangle 8"/>
           <p:cNvSpPr/>
           <p:nvPr/>
         </p:nvSpPr>
         <p:spPr>
-          <a:xfrm rot="16200000">
-            <a:off x="4921666" y="2066540"/>
+          <a:xfrm>
+            <a:off x="7712397" y="2564238"/>
+            <a:ext cx="708186" cy="285783"/>
+          </a:xfrm>
+          <a:prstGeom prst="rect">
+            <a:avLst/>
+          </a:prstGeom>
+          <a:ln w="19050">
+            <a:solidFill>
+              <a:srgbClr val="7030A0"/>
+            </a:solidFill>
+          </a:ln>
+          <a:effectLst/>
+        </p:spPr>
+        <p:style>
+          <a:lnRef idx="1">
+            <a:schemeClr val="accent4"/>
+          </a:lnRef>
+          <a:fillRef idx="2">
+            <a:schemeClr val="accent4"/>
+          </a:fillRef>
+          <a:effectRef idx="1">
+            <a:schemeClr val="accent4"/>
+          </a:effectRef>
+          <a:fontRef idx="minor">
+            <a:schemeClr val="dk1"/>
+          </a:fontRef>
+        </p:style>
+        <p:txBody>
+          <a:bodyPr rtlCol="0" anchor="ctr"/>
+          <a:lstStyle/>
+          <a:p>
+            <a:pPr algn="ctr"/>
+            <a:r>
+              <a:rPr lang="en-US" sz="1050" dirty="0" smtClean="0">
+                <a:solidFill>
+                  <a:srgbClr val="7030A0"/>
+                </a:solidFill>
+              </a:rPr>
+              <a:t>Name</a:t>
+            </a:r>
+            <a:endParaRPr lang="en-SG" sz="1050" dirty="0">
+              <a:solidFill>
+                <a:srgbClr val="7030A0"/>
+              </a:solidFill>
+            </a:endParaRPr>
+          </a:p>
+        </p:txBody>
+      </p:sp>
+      <p:sp>
+        <p:nvSpPr>
+          <p:cNvPr id="78" name="Flowchart: Decision 96"/>
+          <p:cNvSpPr/>
+          <p:nvPr/>
+        </p:nvSpPr>
+        <p:spPr>
+          <a:xfrm>
+            <a:off x="7041947" y="2798420"/>
             <a:ext cx="236048" cy="173380"/>
           </a:xfrm>
           <a:prstGeom prst="flowChartDecision">
             <a:avLst/>
           </a:prstGeom>
-          <a:noFill/>
+          <a:solidFill>
+            <a:srgbClr val="7030A0"/>
+          </a:solidFill>
           <a:ln w="19050">
             <a:solidFill>
               <a:srgbClr val="7030A0"/>
@@ -4696,19 +4621,19 @@
       </p:sp>
       <p:cxnSp>
         <p:nvCxnSpPr>
-          <p:cNvPr id="69" name="Elbow Connector 68"/>
+          <p:cNvPr id="79" name="Elbow Connector 78"/>
           <p:cNvCxnSpPr>
-            <a:stCxn id="68" idx="3"/>
-            <a:endCxn id="67" idx="1"/>
+            <a:stCxn id="78" idx="3"/>
+            <a:endCxn id="76" idx="1"/>
           </p:cNvCxnSpPr>
           <p:nvPr/>
         </p:nvCxnSpPr>
         <p:spPr>
-          <a:xfrm rot="5400000" flipH="1" flipV="1">
-            <a:off x="5161650" y="1860752"/>
-            <a:ext cx="52494" cy="296415"/>
-          </a:xfrm>
-          <a:prstGeom prst="bentConnector2">
+          <a:xfrm flipV="1">
+            <a:off x="7277995" y="2707130"/>
+            <a:ext cx="434402" cy="177980"/>
+          </a:xfrm>
+          <a:prstGeom prst="bentConnector3">
             <a:avLst/>
           </a:prstGeom>
           <a:ln w="19050">
@@ -4737,14 +4662,14 @@
       </p:cxnSp>
       <p:sp>
         <p:nvSpPr>
-          <p:cNvPr id="72" name="Rectangle 8"/>
+          <p:cNvPr id="83" name="Rectangle 8"/>
           <p:cNvSpPr/>
           <p:nvPr/>
         </p:nvSpPr>
         <p:spPr>
           <a:xfrm>
-            <a:off x="5128257" y="3429000"/>
-            <a:ext cx="1156969" cy="346760"/>
+            <a:off x="7712397" y="2914617"/>
+            <a:ext cx="708186" cy="285783"/>
           </a:xfrm>
           <a:prstGeom prst="rect">
             <a:avLst/>
@@ -4776,27 +4701,20 @@
           <a:p>
             <a:pPr algn="ctr"/>
             <a:r>
-              <a:rPr lang="en-US" sz="1050" dirty="0" smtClean="0">
-                <a:solidFill>
-                  <a:srgbClr val="7030A0"/>
-                </a:solidFill>
-              </a:rPr>
-              <a:t>&lt;&lt;interface&gt;&gt;</a:t>
-            </a:r>
-            <a:br>
-              <a:rPr lang="en-US" sz="1050" dirty="0" smtClean="0">
-                <a:solidFill>
-                  <a:srgbClr val="7030A0"/>
-                </a:solidFill>
-              </a:rPr>
-            </a:br>
-            <a:r>
               <a:rPr lang="en-US" sz="1050" dirty="0" err="1" smtClean="0">
                 <a:solidFill>
                   <a:srgbClr val="7030A0"/>
                 </a:solidFill>
               </a:rPr>
-              <a:t>ReadOnlyTask</a:t>
+              <a:t>Task</a:t>
+            </a:r>
+            <a:r>
+              <a:rPr lang="en-US" sz="1050" dirty="0" err="1" smtClean="0">
+                <a:solidFill>
+                  <a:srgbClr val="7030A0"/>
+                </a:solidFill>
+              </a:rPr>
+              <a:t>Date</a:t>
             </a:r>
             <a:endParaRPr lang="en-SG" sz="1050" dirty="0">
               <a:solidFill>
@@ -4806,122 +4724,19 @@
           </a:p>
         </p:txBody>
       </p:sp>
-      <p:sp>
-        <p:nvSpPr>
-          <p:cNvPr id="76" name="Rectangle 8"/>
-          <p:cNvSpPr/>
-          <p:nvPr/>
-        </p:nvSpPr>
-        <p:spPr>
-          <a:xfrm>
-            <a:off x="7712397" y="2564238"/>
-            <a:ext cx="708186" cy="285783"/>
-          </a:xfrm>
-          <a:prstGeom prst="rect">
-            <a:avLst/>
-          </a:prstGeom>
-          <a:ln w="19050">
-            <a:solidFill>
-              <a:srgbClr val="7030A0"/>
-            </a:solidFill>
-          </a:ln>
-          <a:effectLst/>
-        </p:spPr>
-        <p:style>
-          <a:lnRef idx="1">
-            <a:schemeClr val="accent4"/>
-          </a:lnRef>
-          <a:fillRef idx="2">
-            <a:schemeClr val="accent4"/>
-          </a:fillRef>
-          <a:effectRef idx="1">
-            <a:schemeClr val="accent4"/>
-          </a:effectRef>
-          <a:fontRef idx="minor">
-            <a:schemeClr val="dk1"/>
-          </a:fontRef>
-        </p:style>
-        <p:txBody>
-          <a:bodyPr rtlCol="0" anchor="ctr"/>
-          <a:lstStyle/>
-          <a:p>
-            <a:pPr algn="ctr"/>
-            <a:r>
-              <a:rPr lang="en-US" sz="1050" dirty="0" smtClean="0">
-                <a:solidFill>
-                  <a:srgbClr val="7030A0"/>
-                </a:solidFill>
-              </a:rPr>
-              <a:t>Name</a:t>
-            </a:r>
-            <a:endParaRPr lang="en-SG" sz="1050" dirty="0">
-              <a:solidFill>
-                <a:srgbClr val="7030A0"/>
-              </a:solidFill>
-            </a:endParaRPr>
-          </a:p>
-        </p:txBody>
-      </p:sp>
-      <p:sp>
-        <p:nvSpPr>
-          <p:cNvPr id="78" name="Flowchart: Decision 96"/>
-          <p:cNvSpPr/>
-          <p:nvPr/>
-        </p:nvSpPr>
-        <p:spPr>
-          <a:xfrm>
-            <a:off x="7041947" y="2948201"/>
-            <a:ext cx="236048" cy="173380"/>
-          </a:xfrm>
-          <a:prstGeom prst="flowChartDecision">
-            <a:avLst/>
-          </a:prstGeom>
-          <a:solidFill>
-            <a:srgbClr val="7030A0"/>
-          </a:solidFill>
-          <a:ln w="19050">
-            <a:solidFill>
-              <a:srgbClr val="7030A0"/>
-            </a:solidFill>
-          </a:ln>
-          <a:effectLst/>
-        </p:spPr>
-        <p:style>
-          <a:lnRef idx="1">
-            <a:schemeClr val="accent6"/>
-          </a:lnRef>
-          <a:fillRef idx="2">
-            <a:schemeClr val="accent6"/>
-          </a:fillRef>
-          <a:effectRef idx="1">
-            <a:schemeClr val="accent6"/>
-          </a:effectRef>
-          <a:fontRef idx="minor">
-            <a:schemeClr val="dk1"/>
-          </a:fontRef>
-        </p:style>
-        <p:txBody>
-          <a:bodyPr rtlCol="0" anchor="ctr"/>
-          <a:lstStyle/>
-          <a:p>
-            <a:pPr algn="ctr"/>
-            <a:endParaRPr lang="en-US" sz="1050"/>
-          </a:p>
-        </p:txBody>
-      </p:sp>
       <p:cxnSp>
         <p:nvCxnSpPr>
-          <p:cNvPr id="79" name="Elbow Connector 78"/>
+          <p:cNvPr id="84" name="Elbow Connector 83"/>
           <p:cNvCxnSpPr>
             <a:stCxn id="78" idx="3"/>
-            <a:endCxn id="76" idx="1"/>
+            <a:endCxn id="83" idx="1"/>
           </p:cNvCxnSpPr>
           <p:nvPr/>
         </p:nvCxnSpPr>
         <p:spPr>
-          <a:xfrm flipV="1">
-            <a:off x="7277995" y="2707130"/>
-            <a:ext cx="434402" cy="327761"/>
+          <a:xfrm>
+            <a:off x="7277995" y="2885110"/>
+            <a:ext cx="434402" cy="172399"/>
           </a:xfrm>
           <a:prstGeom prst="bentConnector3">
             <a:avLst/>
@@ -4952,14 +4767,14 @@
       </p:cxnSp>
       <p:sp>
         <p:nvSpPr>
-          <p:cNvPr id="80" name="Rectangle 8"/>
+          <p:cNvPr id="100" name="Rectangle 8"/>
           <p:cNvSpPr/>
           <p:nvPr/>
         </p:nvSpPr>
         <p:spPr>
           <a:xfrm>
-            <a:off x="7712397" y="2887216"/>
-            <a:ext cx="708186" cy="285783"/>
+            <a:off x="2660303" y="1806470"/>
+            <a:ext cx="1539926" cy="346760"/>
           </a:xfrm>
           <a:prstGeom prst="rect">
             <a:avLst/>
@@ -4991,12 +4806,27 @@
           <a:p>
             <a:pPr algn="ctr"/>
             <a:r>
-              <a:rPr lang="en-US" sz="1050" dirty="0" err="1" smtClean="0">
+              <a:rPr lang="en-US" sz="1050" dirty="0" smtClean="0">
                 <a:solidFill>
                   <a:srgbClr val="7030A0"/>
                 </a:solidFill>
               </a:rPr>
-              <a:t>StartDate</a:t>
+              <a:t>&lt;&lt;interface&gt;&gt;</a:t>
+            </a:r>
+            <a:br>
+              <a:rPr lang="en-US" sz="1050" dirty="0" smtClean="0">
+                <a:solidFill>
+                  <a:srgbClr val="7030A0"/>
+                </a:solidFill>
+              </a:rPr>
+            </a:br>
+            <a:r>
+              <a:rPr lang="en-US" sz="1050" smtClean="0">
+                <a:solidFill>
+                  <a:srgbClr val="7030A0"/>
+                </a:solidFill>
+              </a:rPr>
+              <a:t>ReadOnlyTaskManager</a:t>
             </a:r>
             <a:endParaRPr lang="en-SG" sz="1050" dirty="0">
               <a:solidFill>
@@ -5006,57 +4836,55 @@
           </a:p>
         </p:txBody>
       </p:sp>
-      <p:cxnSp>
-        <p:nvCxnSpPr>
-          <p:cNvPr id="81" name="Elbow Connector 80"/>
-          <p:cNvCxnSpPr>
-            <a:stCxn id="78" idx="3"/>
-            <a:endCxn id="80" idx="1"/>
-          </p:cNvCxnSpPr>
+      <p:sp>
+        <p:nvSpPr>
+          <p:cNvPr id="114" name="TextBox 113"/>
+          <p:cNvSpPr txBox="1"/>
           <p:nvPr/>
-        </p:nvCxnSpPr>
-        <p:spPr>
-          <a:xfrm flipV="1">
-            <a:off x="7277995" y="3030108"/>
-            <a:ext cx="434402" cy="4783"/>
-          </a:xfrm>
-          <a:prstGeom prst="bentConnector3">
+        </p:nvSpPr>
+        <p:spPr>
+          <a:xfrm rot="16200000">
+            <a:off x="6527512" y="3586305"/>
+            <a:ext cx="881018" cy="261610"/>
+          </a:xfrm>
+          <a:prstGeom prst="rect">
             <a:avLst/>
           </a:prstGeom>
-          <a:ln w="19050">
-            <a:solidFill>
-              <a:srgbClr val="7030A0"/>
-            </a:solidFill>
-            <a:headEnd type="none" w="med" len="med"/>
-            <a:tailEnd type="arrow" w="med" len="med"/>
-          </a:ln>
-          <a:effectLst/>
-        </p:spPr>
-        <p:style>
-          <a:lnRef idx="1">
-            <a:schemeClr val="accent2"/>
-          </a:lnRef>
-          <a:fillRef idx="2">
-            <a:schemeClr val="accent2"/>
-          </a:fillRef>
-          <a:effectRef idx="1">
-            <a:schemeClr val="accent2"/>
-          </a:effectRef>
-          <a:fontRef idx="minor">
-            <a:schemeClr val="dk1"/>
-          </a:fontRef>
-        </p:style>
-      </p:cxnSp>
-      <p:sp>
-        <p:nvSpPr>
-          <p:cNvPr id="83" name="Rectangle 8"/>
+          <a:noFill/>
+        </p:spPr>
+        <p:txBody>
+          <a:bodyPr wrap="square" rtlCol="0">
+            <a:spAutoFit/>
+          </a:bodyPr>
+          <a:lstStyle/>
+          <a:p>
+            <a:pPr algn="r"/>
+            <a:r>
+              <a:rPr lang="en-US" sz="1100" dirty="0" smtClean="0">
+                <a:solidFill>
+                  <a:srgbClr val="7030A0"/>
+                </a:solidFill>
+              </a:rPr>
+              <a:t>filtered list</a:t>
+            </a:r>
+            <a:endParaRPr lang="en-SG" sz="1100" dirty="0">
+              <a:solidFill>
+                <a:srgbClr val="7030A0"/>
+              </a:solidFill>
+            </a:endParaRPr>
+          </a:p>
+        </p:txBody>
+      </p:sp>
+      <p:sp>
+        <p:nvSpPr>
+          <p:cNvPr id="122" name="Rectangle 8"/>
           <p:cNvSpPr/>
           <p:nvPr/>
         </p:nvSpPr>
         <p:spPr>
           <a:xfrm>
-            <a:off x="7712397" y="3210194"/>
-            <a:ext cx="708186" cy="285783"/>
+            <a:off x="2057400" y="4813398"/>
+            <a:ext cx="1775949" cy="368200"/>
           </a:xfrm>
           <a:prstGeom prst="rect">
             <a:avLst/>
@@ -5088,304 +4916,6 @@
           <a:p>
             <a:pPr algn="ctr"/>
             <a:r>
-              <a:rPr lang="en-US" sz="1050" dirty="0" err="1" smtClean="0">
-                <a:solidFill>
-                  <a:srgbClr val="7030A0"/>
-                </a:solidFill>
-              </a:rPr>
-              <a:t>EndDate</a:t>
-            </a:r>
-            <a:endParaRPr lang="en-SG" sz="1050" dirty="0">
-              <a:solidFill>
-                <a:srgbClr val="7030A0"/>
-              </a:solidFill>
-            </a:endParaRPr>
-          </a:p>
-        </p:txBody>
-      </p:sp>
-      <p:cxnSp>
-        <p:nvCxnSpPr>
-          <p:cNvPr id="84" name="Elbow Connector 83"/>
-          <p:cNvCxnSpPr>
-            <a:stCxn id="78" idx="3"/>
-            <a:endCxn id="83" idx="1"/>
-          </p:cNvCxnSpPr>
-          <p:nvPr/>
-        </p:nvCxnSpPr>
-        <p:spPr>
-          <a:xfrm>
-            <a:off x="7277995" y="3034891"/>
-            <a:ext cx="434402" cy="318195"/>
-          </a:xfrm>
-          <a:prstGeom prst="bentConnector3">
-            <a:avLst/>
-          </a:prstGeom>
-          <a:ln w="19050">
-            <a:solidFill>
-              <a:srgbClr val="7030A0"/>
-            </a:solidFill>
-            <a:headEnd type="none" w="med" len="med"/>
-            <a:tailEnd type="arrow" w="med" len="med"/>
-          </a:ln>
-          <a:effectLst/>
-        </p:spPr>
-        <p:style>
-          <a:lnRef idx="1">
-            <a:schemeClr val="accent2"/>
-          </a:lnRef>
-          <a:fillRef idx="2">
-            <a:schemeClr val="accent2"/>
-          </a:fillRef>
-          <a:effectRef idx="1">
-            <a:schemeClr val="accent2"/>
-          </a:effectRef>
-          <a:fontRef idx="minor">
-            <a:schemeClr val="dk1"/>
-          </a:fontRef>
-        </p:style>
-      </p:cxnSp>
-      <p:cxnSp>
-        <p:nvCxnSpPr>
-          <p:cNvPr id="97" name="Elbow Connector 63"/>
-          <p:cNvCxnSpPr>
-            <a:stCxn id="99" idx="3"/>
-          </p:cNvCxnSpPr>
-          <p:nvPr/>
-        </p:nvCxnSpPr>
-        <p:spPr>
-          <a:xfrm rot="16200000" flipH="1">
-            <a:off x="3279321" y="2485431"/>
-            <a:ext cx="293825" cy="1"/>
-          </a:xfrm>
-          <a:prstGeom prst="bentConnector3">
-            <a:avLst>
-              <a:gd name="adj1" fmla="val 50000"/>
-            </a:avLst>
-          </a:prstGeom>
-          <a:ln w="19050">
-            <a:solidFill>
-              <a:srgbClr val="7030A0"/>
-            </a:solidFill>
-            <a:prstDash val="sysDot"/>
-            <a:headEnd type="none" w="med" len="med"/>
-            <a:tailEnd type="none" w="med" len="med"/>
-          </a:ln>
-          <a:effectLst/>
-        </p:spPr>
-        <p:style>
-          <a:lnRef idx="1">
-            <a:schemeClr val="accent2"/>
-          </a:lnRef>
-          <a:fillRef idx="2">
-            <a:schemeClr val="accent2"/>
-          </a:fillRef>
-          <a:effectRef idx="1">
-            <a:schemeClr val="accent2"/>
-          </a:effectRef>
-          <a:fontRef idx="minor">
-            <a:schemeClr val="dk1"/>
-          </a:fontRef>
-        </p:style>
-      </p:cxnSp>
-      <p:sp>
-        <p:nvSpPr>
-          <p:cNvPr id="99" name="Isosceles Triangle 102"/>
-          <p:cNvSpPr/>
-          <p:nvPr/>
-        </p:nvSpPr>
-        <p:spPr>
-          <a:xfrm rot="10800000" flipV="1">
-            <a:off x="3290981" y="2162997"/>
-            <a:ext cx="270504" cy="175523"/>
-          </a:xfrm>
-          <a:prstGeom prst="triangle">
-            <a:avLst/>
-          </a:prstGeom>
-          <a:ln w="19050">
-            <a:solidFill>
-              <a:srgbClr val="7030A0"/>
-            </a:solidFill>
-          </a:ln>
-          <a:effectLst/>
-        </p:spPr>
-        <p:style>
-          <a:lnRef idx="1">
-            <a:schemeClr val="accent4"/>
-          </a:lnRef>
-          <a:fillRef idx="2">
-            <a:schemeClr val="accent4"/>
-          </a:fillRef>
-          <a:effectRef idx="1">
-            <a:schemeClr val="accent4"/>
-          </a:effectRef>
-          <a:fontRef idx="minor">
-            <a:schemeClr val="dk1"/>
-          </a:fontRef>
-        </p:style>
-        <p:txBody>
-          <a:bodyPr rtlCol="0" anchor="ctr"/>
-          <a:lstStyle/>
-          <a:p>
-            <a:pPr algn="ctr"/>
-            <a:endParaRPr lang="en-SG" sz="1050" b="1">
-              <a:solidFill>
-                <a:srgbClr val="92D050"/>
-              </a:solidFill>
-            </a:endParaRPr>
-          </a:p>
-        </p:txBody>
-      </p:sp>
-      <p:sp>
-        <p:nvSpPr>
-          <p:cNvPr id="100" name="Rectangle 8"/>
-          <p:cNvSpPr/>
-          <p:nvPr/>
-        </p:nvSpPr>
-        <p:spPr>
-          <a:xfrm>
-            <a:off x="2660303" y="1806470"/>
-            <a:ext cx="1539926" cy="346760"/>
-          </a:xfrm>
-          <a:prstGeom prst="rect">
-            <a:avLst/>
-          </a:prstGeom>
-          <a:ln w="19050">
-            <a:solidFill>
-              <a:srgbClr val="7030A0"/>
-            </a:solidFill>
-          </a:ln>
-          <a:effectLst/>
-        </p:spPr>
-        <p:style>
-          <a:lnRef idx="1">
-            <a:schemeClr val="accent4"/>
-          </a:lnRef>
-          <a:fillRef idx="2">
-            <a:schemeClr val="accent4"/>
-          </a:fillRef>
-          <a:effectRef idx="1">
-            <a:schemeClr val="accent4"/>
-          </a:effectRef>
-          <a:fontRef idx="minor">
-            <a:schemeClr val="dk1"/>
-          </a:fontRef>
-        </p:style>
-        <p:txBody>
-          <a:bodyPr rtlCol="0" anchor="ctr"/>
-          <a:lstStyle/>
-          <a:p>
-            <a:pPr algn="ctr"/>
-            <a:r>
-              <a:rPr lang="en-US" sz="1050" dirty="0" smtClean="0">
-                <a:solidFill>
-                  <a:srgbClr val="7030A0"/>
-                </a:solidFill>
-              </a:rPr>
-              <a:t>&lt;&lt;interface&gt;&gt;</a:t>
-            </a:r>
-            <a:br>
-              <a:rPr lang="en-US" sz="1050" dirty="0" smtClean="0">
-                <a:solidFill>
-                  <a:srgbClr val="7030A0"/>
-                </a:solidFill>
-              </a:rPr>
-            </a:br>
-            <a:r>
-              <a:rPr lang="en-US" sz="1050" smtClean="0">
-                <a:solidFill>
-                  <a:srgbClr val="7030A0"/>
-                </a:solidFill>
-              </a:rPr>
-              <a:t>ReadOnlyTaskManager</a:t>
-            </a:r>
-            <a:endParaRPr lang="en-SG" sz="1050" dirty="0">
-              <a:solidFill>
-                <a:srgbClr val="7030A0"/>
-              </a:solidFill>
-            </a:endParaRPr>
-          </a:p>
-        </p:txBody>
-      </p:sp>
-      <p:sp>
-        <p:nvSpPr>
-          <p:cNvPr id="114" name="TextBox 113"/>
-          <p:cNvSpPr txBox="1"/>
-          <p:nvPr/>
-        </p:nvSpPr>
-        <p:spPr>
-          <a:xfrm rot="16200000">
-            <a:off x="6527512" y="3586305"/>
-            <a:ext cx="881018" cy="261610"/>
-          </a:xfrm>
-          <a:prstGeom prst="rect">
-            <a:avLst/>
-          </a:prstGeom>
-          <a:noFill/>
-        </p:spPr>
-        <p:txBody>
-          <a:bodyPr wrap="square" rtlCol="0">
-            <a:spAutoFit/>
-          </a:bodyPr>
-          <a:lstStyle/>
-          <a:p>
-            <a:pPr algn="r"/>
-            <a:r>
-              <a:rPr lang="en-US" sz="1100" dirty="0" smtClean="0">
-                <a:solidFill>
-                  <a:srgbClr val="7030A0"/>
-                </a:solidFill>
-              </a:rPr>
-              <a:t>filtered list</a:t>
-            </a:r>
-            <a:endParaRPr lang="en-SG" sz="1100" dirty="0">
-              <a:solidFill>
-                <a:srgbClr val="7030A0"/>
-              </a:solidFill>
-            </a:endParaRPr>
-          </a:p>
-        </p:txBody>
-      </p:sp>
-      <p:sp>
-        <p:nvSpPr>
-          <p:cNvPr id="122" name="Rectangle 8"/>
-          <p:cNvSpPr/>
-          <p:nvPr/>
-        </p:nvSpPr>
-        <p:spPr>
-          <a:xfrm>
-            <a:off x="2057400" y="4239491"/>
-            <a:ext cx="1775949" cy="346760"/>
-          </a:xfrm>
-          <a:prstGeom prst="rect">
-            <a:avLst/>
-          </a:prstGeom>
-          <a:ln w="19050">
-            <a:solidFill>
-              <a:srgbClr val="7030A0"/>
-            </a:solidFill>
-          </a:ln>
-          <a:effectLst/>
-        </p:spPr>
-        <p:style>
-          <a:lnRef idx="1">
-            <a:schemeClr val="accent4"/>
-          </a:lnRef>
-          <a:fillRef idx="2">
-            <a:schemeClr val="accent4"/>
-          </a:fillRef>
-          <a:effectRef idx="1">
-            <a:schemeClr val="accent4"/>
-          </a:effectRef>
-          <a:fontRef idx="minor">
-            <a:schemeClr val="dk1"/>
-          </a:fontRef>
-        </p:style>
-        <p:txBody>
-          <a:bodyPr rtlCol="0" anchor="ctr"/>
-          <a:lstStyle/>
-          <a:p>
-            <a:pPr algn="ctr"/>
-            <a:r>
               <a:rPr lang="en-US" sz="1050" dirty="0" smtClean="0">
                 <a:solidFill>
                   <a:srgbClr val="7030A0"/>
@@ -5435,8 +4965,8 @@
         </p:nvCxnSpPr>
         <p:spPr>
           <a:xfrm rot="16200000" flipH="1">
-            <a:off x="1364475" y="3719945"/>
-            <a:ext cx="831471" cy="554380"/>
+            <a:off x="1072161" y="4012259"/>
+            <a:ext cx="1416098" cy="554380"/>
           </a:xfrm>
           <a:prstGeom prst="bentConnector2">
             <a:avLst/>
@@ -5477,8 +5007,8 @@
         </p:nvCxnSpPr>
         <p:spPr>
           <a:xfrm rot="16200000" flipV="1">
-            <a:off x="5948976" y="2139271"/>
-            <a:ext cx="404117" cy="1033473"/>
+            <a:off x="6027389" y="2060858"/>
+            <a:ext cx="247291" cy="1033473"/>
           </a:xfrm>
           <a:prstGeom prst="bentConnector2">
             <a:avLst/>
@@ -5554,7 +5084,7 @@
         </p:nvSpPr>
         <p:spPr>
           <a:xfrm>
-            <a:off x="4324972" y="3058864"/>
+            <a:off x="4324972" y="2895600"/>
             <a:ext cx="189257" cy="178683"/>
           </a:xfrm>
           <a:prstGeom prst="rect">
@@ -5704,13 +5234,259 @@
       </p:sp>
       <p:sp>
         <p:nvSpPr>
+          <p:cNvPr id="46" name="Rectangle 8"/>
+          <p:cNvSpPr/>
+          <p:nvPr/>
+        </p:nvSpPr>
+        <p:spPr>
+          <a:xfrm>
+            <a:off x="2879760" y="2445989"/>
+            <a:ext cx="1093635" cy="346760"/>
+          </a:xfrm>
+          <a:prstGeom prst="rect">
+            <a:avLst/>
+          </a:prstGeom>
+          <a:ln w="19050">
+            <a:solidFill>
+              <a:srgbClr val="7030A0"/>
+            </a:solidFill>
+          </a:ln>
+          <a:effectLst/>
+        </p:spPr>
+        <p:style>
+          <a:lnRef idx="1">
+            <a:schemeClr val="accent4"/>
+          </a:lnRef>
+          <a:fillRef idx="2">
+            <a:schemeClr val="accent4"/>
+          </a:fillRef>
+          <a:effectRef idx="1">
+            <a:schemeClr val="accent4"/>
+          </a:effectRef>
+          <a:fontRef idx="minor">
+            <a:schemeClr val="dk1"/>
+          </a:fontRef>
+        </p:style>
+        <p:txBody>
+          <a:bodyPr rtlCol="0" anchor="ctr"/>
+          <a:lstStyle/>
+          <a:p>
+            <a:pPr algn="ctr"/>
+            <a:r>
+              <a:rPr lang="en-US" sz="1050" dirty="0" err="1" smtClean="0">
+                <a:solidFill>
+                  <a:srgbClr val="7030A0"/>
+                </a:solidFill>
+              </a:rPr>
+              <a:t>TaskManager</a:t>
+            </a:r>
+            <a:endParaRPr lang="en-SG" sz="1050" dirty="0">
+              <a:solidFill>
+                <a:srgbClr val="7030A0"/>
+              </a:solidFill>
+            </a:endParaRPr>
+          </a:p>
+        </p:txBody>
+      </p:sp>
+      <p:cxnSp>
+        <p:nvCxnSpPr>
+          <p:cNvPr id="47" name="Straight Arrow Connector 46"/>
+          <p:cNvCxnSpPr>
+            <a:stCxn id="48" idx="3"/>
+            <a:endCxn id="46" idx="1"/>
+          </p:cNvCxnSpPr>
+          <p:nvPr/>
+        </p:nvCxnSpPr>
+        <p:spPr>
+          <a:xfrm>
+            <a:off x="2658950" y="2614085"/>
+            <a:ext cx="220810" cy="5284"/>
+          </a:xfrm>
+          <a:prstGeom prst="straightConnector1">
+            <a:avLst/>
+          </a:prstGeom>
+          <a:ln w="19050">
+            <a:solidFill>
+              <a:srgbClr val="7030A0"/>
+            </a:solidFill>
+            <a:headEnd type="none" w="med" len="med"/>
+            <a:tailEnd type="arrow" w="med" len="med"/>
+          </a:ln>
+          <a:effectLst/>
+        </p:spPr>
+        <p:style>
+          <a:lnRef idx="1">
+            <a:schemeClr val="accent2"/>
+          </a:lnRef>
+          <a:fillRef idx="2">
+            <a:schemeClr val="accent2"/>
+          </a:fillRef>
+          <a:effectRef idx="1">
+            <a:schemeClr val="accent2"/>
+          </a:effectRef>
+          <a:fontRef idx="minor">
+            <a:schemeClr val="dk1"/>
+          </a:fontRef>
+        </p:style>
+      </p:cxnSp>
+      <p:sp>
+        <p:nvSpPr>
+          <p:cNvPr id="48" name="Flowchart: Decision 96"/>
+          <p:cNvSpPr/>
+          <p:nvPr/>
+        </p:nvSpPr>
+        <p:spPr>
+          <a:xfrm>
+            <a:off x="2422902" y="2527395"/>
+            <a:ext cx="236048" cy="173380"/>
+          </a:xfrm>
+          <a:prstGeom prst="flowChartDecision">
+            <a:avLst/>
+          </a:prstGeom>
+          <a:noFill/>
+          <a:ln w="19050">
+            <a:solidFill>
+              <a:srgbClr val="7030A0"/>
+            </a:solidFill>
+          </a:ln>
+          <a:effectLst/>
+        </p:spPr>
+        <p:style>
+          <a:lnRef idx="1">
+            <a:schemeClr val="accent6"/>
+          </a:lnRef>
+          <a:fillRef idx="2">
+            <a:schemeClr val="accent6"/>
+          </a:fillRef>
+          <a:effectRef idx="1">
+            <a:schemeClr val="accent6"/>
+          </a:effectRef>
+          <a:fontRef idx="minor">
+            <a:schemeClr val="dk1"/>
+          </a:fontRef>
+        </p:style>
+        <p:txBody>
+          <a:bodyPr rtlCol="0" anchor="ctr"/>
+          <a:lstStyle/>
+          <a:p>
+            <a:pPr algn="ctr"/>
+            <a:endParaRPr lang="en-US" sz="1050"/>
+          </a:p>
+        </p:txBody>
+      </p:sp>
+      <p:grpSp>
+        <p:nvGrpSpPr>
+          <p:cNvPr id="31" name="Group 30"/>
+          <p:cNvGrpSpPr/>
+          <p:nvPr/>
+        </p:nvGrpSpPr>
+        <p:grpSpPr>
+          <a:xfrm>
+            <a:off x="3290981" y="2162997"/>
+            <a:ext cx="270504" cy="287916"/>
+            <a:chOff x="3290981" y="2162997"/>
+            <a:chExt cx="270504" cy="287916"/>
+          </a:xfrm>
+        </p:grpSpPr>
+        <p:sp>
+          <p:nvSpPr>
+            <p:cNvPr id="99" name="Isosceles Triangle 102"/>
+            <p:cNvSpPr/>
+            <p:nvPr/>
+          </p:nvSpPr>
+          <p:spPr>
+            <a:xfrm rot="10800000" flipV="1">
+              <a:off x="3290981" y="2162997"/>
+              <a:ext cx="270504" cy="175523"/>
+            </a:xfrm>
+            <a:prstGeom prst="triangle">
+              <a:avLst/>
+            </a:prstGeom>
+            <a:ln w="19050">
+              <a:solidFill>
+                <a:srgbClr val="7030A0"/>
+              </a:solidFill>
+            </a:ln>
+            <a:effectLst/>
+          </p:spPr>
+          <p:style>
+            <a:lnRef idx="1">
+              <a:schemeClr val="accent4"/>
+            </a:lnRef>
+            <a:fillRef idx="2">
+              <a:schemeClr val="accent4"/>
+            </a:fillRef>
+            <a:effectRef idx="1">
+              <a:schemeClr val="accent4"/>
+            </a:effectRef>
+            <a:fontRef idx="minor">
+              <a:schemeClr val="dk1"/>
+            </a:fontRef>
+          </p:style>
+          <p:txBody>
+            <a:bodyPr rtlCol="0" anchor="ctr"/>
+            <a:lstStyle/>
+            <a:p>
+              <a:pPr algn="ctr"/>
+              <a:endParaRPr lang="en-SG" sz="1050" b="1">
+                <a:solidFill>
+                  <a:srgbClr val="92D050"/>
+                </a:solidFill>
+              </a:endParaRPr>
+            </a:p>
+          </p:txBody>
+        </p:sp>
+        <p:cxnSp>
+          <p:nvCxnSpPr>
+            <p:cNvPr id="97" name="Elbow Connector 63"/>
+            <p:cNvCxnSpPr/>
+            <p:nvPr/>
+          </p:nvCxnSpPr>
+          <p:spPr>
+            <a:xfrm rot="5400000">
+              <a:off x="3385535" y="2404850"/>
+              <a:ext cx="87032" cy="5094"/>
+            </a:xfrm>
+            <a:prstGeom prst="bentConnector3">
+              <a:avLst>
+                <a:gd name="adj1" fmla="val 50000"/>
+              </a:avLst>
+            </a:prstGeom>
+            <a:ln w="19050">
+              <a:solidFill>
+                <a:srgbClr val="7030A0"/>
+              </a:solidFill>
+              <a:prstDash val="sysDot"/>
+              <a:headEnd type="none" w="med" len="med"/>
+              <a:tailEnd type="none" w="med" len="med"/>
+            </a:ln>
+            <a:effectLst/>
+          </p:spPr>
+          <p:style>
+            <a:lnRef idx="1">
+              <a:schemeClr val="accent2"/>
+            </a:lnRef>
+            <a:fillRef idx="2">
+              <a:schemeClr val="accent2"/>
+            </a:fillRef>
+            <a:effectRef idx="1">
+              <a:schemeClr val="accent2"/>
+            </a:effectRef>
+            <a:fontRef idx="minor">
+              <a:schemeClr val="dk1"/>
+            </a:fontRef>
+          </p:style>
+        </p:cxnSp>
+      </p:grpSp>
+      <p:sp>
+        <p:nvSpPr>
           <p:cNvPr id="65" name="TextBox 64"/>
           <p:cNvSpPr txBox="1"/>
           <p:nvPr/>
         </p:nvSpPr>
         <p:spPr>
           <a:xfrm>
-            <a:off x="2687923" y="2564238"/>
+            <a:off x="2688193" y="2382807"/>
             <a:ext cx="189257" cy="178683"/>
           </a:xfrm>
           <a:prstGeom prst="rect">
@@ -5743,13 +5519,212 @@
       </p:sp>
       <p:sp>
         <p:nvSpPr>
-          <p:cNvPr id="66" name="TextBox 65"/>
+          <p:cNvPr id="2" name="Rectangle 8"/>
+          <p:cNvSpPr/>
+          <p:nvPr/>
+        </p:nvSpPr>
+        <p:spPr>
+          <a:xfrm>
+            <a:off x="2877180" y="2870307"/>
+            <a:ext cx="1093635" cy="346760"/>
+          </a:xfrm>
+          <a:prstGeom prst="rect">
+            <a:avLst/>
+          </a:prstGeom>
+          <a:solidFill>
+            <a:srgbClr val="7030A0"/>
+          </a:solidFill>
+          <a:ln w="19050">
+            <a:solidFill>
+              <a:srgbClr val="7030A0"/>
+            </a:solidFill>
+          </a:ln>
+          <a:effectLst/>
+        </p:spPr>
+        <p:style>
+          <a:lnRef idx="1">
+            <a:schemeClr val="accent2"/>
+          </a:lnRef>
+          <a:fillRef idx="2">
+            <a:schemeClr val="accent2"/>
+          </a:fillRef>
+          <a:effectRef idx="1">
+            <a:schemeClr val="accent2"/>
+          </a:effectRef>
+          <a:fontRef idx="minor">
+            <a:schemeClr val="dk1"/>
+          </a:fontRef>
+        </p:style>
+        <p:txBody>
+          <a:bodyPr rtlCol="0" anchor="ctr"/>
+          <a:lstStyle/>
+          <a:p>
+            <a:pPr algn="ctr"/>
+            <a:r>
+              <a:rPr lang="en-US" sz="1050" dirty="0" err="1" smtClean="0">
+                <a:solidFill>
+                  <a:schemeClr val="bg1"/>
+                </a:solidFill>
+              </a:rPr>
+              <a:t>UserPref</a:t>
+            </a:r>
+            <a:endParaRPr lang="en-SG" sz="1050" dirty="0">
+              <a:solidFill>
+                <a:schemeClr val="bg1"/>
+              </a:solidFill>
+            </a:endParaRPr>
+          </a:p>
+        </p:txBody>
+      </p:sp>
+      <p:grpSp>
+        <p:nvGrpSpPr>
+          <p:cNvPr id="7" name="Group 6"/>
+          <p:cNvGrpSpPr/>
+          <p:nvPr/>
+        </p:nvGrpSpPr>
+        <p:grpSpPr>
+          <a:xfrm>
+            <a:off x="2420322" y="2951713"/>
+            <a:ext cx="456858" cy="324887"/>
+            <a:chOff x="2420322" y="2951713"/>
+            <a:chExt cx="456858" cy="324887"/>
+          </a:xfrm>
+        </p:grpSpPr>
+        <p:cxnSp>
+          <p:nvCxnSpPr>
+            <p:cNvPr id="58" name="Straight Arrow Connector 57"/>
+            <p:cNvCxnSpPr>
+              <a:stCxn id="42" idx="3"/>
+              <a:endCxn id="2" idx="1"/>
+            </p:cNvCxnSpPr>
+            <p:nvPr/>
+          </p:nvCxnSpPr>
+          <p:spPr>
+            <a:xfrm>
+              <a:off x="2656370" y="3038403"/>
+              <a:ext cx="220810" cy="5284"/>
+            </a:xfrm>
+            <a:prstGeom prst="straightConnector1">
+              <a:avLst/>
+            </a:prstGeom>
+            <a:ln w="19050">
+              <a:solidFill>
+                <a:srgbClr val="7030A0"/>
+              </a:solidFill>
+              <a:headEnd type="none" w="med" len="med"/>
+              <a:tailEnd type="arrow" w="med" len="med"/>
+            </a:ln>
+            <a:effectLst/>
+          </p:spPr>
+          <p:style>
+            <a:lnRef idx="1">
+              <a:schemeClr val="accent2"/>
+            </a:lnRef>
+            <a:fillRef idx="2">
+              <a:schemeClr val="accent2"/>
+            </a:fillRef>
+            <a:effectRef idx="1">
+              <a:schemeClr val="accent2"/>
+            </a:effectRef>
+            <a:fontRef idx="minor">
+              <a:schemeClr val="dk1"/>
+            </a:fontRef>
+          </p:style>
+        </p:cxnSp>
+        <p:sp>
+          <p:nvSpPr>
+            <p:cNvPr id="42" name="Flowchart: Decision 96"/>
+            <p:cNvSpPr/>
+            <p:nvPr/>
+          </p:nvSpPr>
+          <p:spPr>
+            <a:xfrm>
+              <a:off x="2420322" y="2951713"/>
+              <a:ext cx="236048" cy="173380"/>
+            </a:xfrm>
+            <a:prstGeom prst="flowChartDecision">
+              <a:avLst/>
+            </a:prstGeom>
+            <a:noFill/>
+            <a:ln w="19050">
+              <a:solidFill>
+                <a:srgbClr val="7030A0"/>
+              </a:solidFill>
+            </a:ln>
+            <a:effectLst/>
+          </p:spPr>
+          <p:style>
+            <a:lnRef idx="1">
+              <a:schemeClr val="accent6"/>
+            </a:lnRef>
+            <a:fillRef idx="2">
+              <a:schemeClr val="accent6"/>
+            </a:fillRef>
+            <a:effectRef idx="1">
+              <a:schemeClr val="accent6"/>
+            </a:effectRef>
+            <a:fontRef idx="minor">
+              <a:schemeClr val="dk1"/>
+            </a:fontRef>
+          </p:style>
+          <p:txBody>
+            <a:bodyPr rtlCol="0" anchor="ctr"/>
+            <a:lstStyle/>
+            <a:p>
+              <a:pPr algn="ctr"/>
+              <a:endParaRPr lang="en-US" sz="1050"/>
+            </a:p>
+          </p:txBody>
+        </p:sp>
+        <p:sp>
+          <p:nvSpPr>
+            <p:cNvPr id="66" name="TextBox 65"/>
+            <p:cNvSpPr txBox="1"/>
+            <p:nvPr/>
+          </p:nvSpPr>
+          <p:spPr>
+            <a:xfrm>
+              <a:off x="2656370" y="3097917"/>
+              <a:ext cx="189257" cy="178683"/>
+            </a:xfrm>
+            <a:prstGeom prst="rect">
+              <a:avLst/>
+            </a:prstGeom>
+            <a:noFill/>
+          </p:spPr>
+          <p:txBody>
+            <a:bodyPr wrap="square" lIns="0" tIns="0" rIns="0" bIns="0" rtlCol="0">
+              <a:noAutofit/>
+            </a:bodyPr>
+            <a:lstStyle/>
+            <a:p>
+              <a:pPr algn="ctr"/>
+              <a:r>
+                <a:rPr lang="en-US" sz="1100" dirty="0" smtClean="0">
+                  <a:solidFill>
+                    <a:srgbClr val="7030A0"/>
+                  </a:solidFill>
+                </a:rPr>
+                <a:t>1</a:t>
+              </a:r>
+              <a:endParaRPr lang="en-SG" sz="1100" dirty="0">
+                <a:solidFill>
+                  <a:srgbClr val="7030A0"/>
+                </a:solidFill>
+              </a:endParaRPr>
+            </a:p>
+          </p:txBody>
+        </p:sp>
+      </p:grpSp>
+      <p:sp>
+        <p:nvSpPr>
+          <p:cNvPr id="70" name="TextBox 69"/>
           <p:cNvSpPr txBox="1"/>
           <p:nvPr/>
         </p:nvSpPr>
         <p:spPr>
           <a:xfrm>
-            <a:off x="2656370" y="3386050"/>
+            <a:off x="6667770" y="3210194"/>
             <a:ext cx="189257" cy="178683"/>
           </a:xfrm>
           <a:prstGeom prst="rect">
@@ -5780,15 +5755,468 @@
           </a:p>
         </p:txBody>
       </p:sp>
-      <p:sp>
-        <p:nvSpPr>
-          <p:cNvPr id="70" name="TextBox 69"/>
+      <p:grpSp>
+        <p:nvGrpSpPr>
+          <p:cNvPr id="34" name="Group 33"/>
+          <p:cNvGrpSpPr/>
+          <p:nvPr/>
+        </p:nvGrpSpPr>
+        <p:grpSpPr>
+          <a:xfrm>
+            <a:off x="2411780" y="3281974"/>
+            <a:ext cx="1788449" cy="395713"/>
+            <a:chOff x="2411780" y="3281974"/>
+            <a:chExt cx="1788449" cy="395713"/>
+          </a:xfrm>
+        </p:grpSpPr>
+        <p:grpSp>
+          <p:nvGrpSpPr>
+            <p:cNvPr id="73" name="Group 72"/>
+            <p:cNvGrpSpPr/>
+            <p:nvPr/>
+          </p:nvGrpSpPr>
+          <p:grpSpPr>
+            <a:xfrm>
+              <a:off x="2411780" y="3352800"/>
+              <a:ext cx="456858" cy="324887"/>
+              <a:chOff x="2420322" y="2951713"/>
+              <a:chExt cx="456858" cy="324887"/>
+            </a:xfrm>
+          </p:grpSpPr>
+          <p:cxnSp>
+            <p:nvCxnSpPr>
+              <p:cNvPr id="74" name="Straight Arrow Connector 73"/>
+              <p:cNvCxnSpPr>
+                <a:stCxn id="77" idx="3"/>
+              </p:cNvCxnSpPr>
+              <p:nvPr/>
+            </p:nvCxnSpPr>
+            <p:spPr>
+              <a:xfrm>
+                <a:off x="2656370" y="3038403"/>
+                <a:ext cx="220810" cy="5284"/>
+              </a:xfrm>
+              <a:prstGeom prst="straightConnector1">
+                <a:avLst/>
+              </a:prstGeom>
+              <a:ln w="19050">
+                <a:solidFill>
+                  <a:srgbClr val="7030A0"/>
+                </a:solidFill>
+                <a:headEnd type="none" w="med" len="med"/>
+                <a:tailEnd type="arrow" w="med" len="med"/>
+              </a:ln>
+              <a:effectLst/>
+            </p:spPr>
+            <p:style>
+              <a:lnRef idx="1">
+                <a:schemeClr val="accent2"/>
+              </a:lnRef>
+              <a:fillRef idx="2">
+                <a:schemeClr val="accent2"/>
+              </a:fillRef>
+              <a:effectRef idx="1">
+                <a:schemeClr val="accent2"/>
+              </a:effectRef>
+              <a:fontRef idx="minor">
+                <a:schemeClr val="dk1"/>
+              </a:fontRef>
+            </p:style>
+          </p:cxnSp>
+          <p:sp>
+            <p:nvSpPr>
+              <p:cNvPr id="77" name="Flowchart: Decision 96"/>
+              <p:cNvSpPr/>
+              <p:nvPr/>
+            </p:nvSpPr>
+            <p:spPr>
+              <a:xfrm>
+                <a:off x="2420322" y="2951713"/>
+                <a:ext cx="236048" cy="173380"/>
+              </a:xfrm>
+              <a:prstGeom prst="flowChartDecision">
+                <a:avLst/>
+              </a:prstGeom>
+              <a:noFill/>
+              <a:ln w="19050">
+                <a:solidFill>
+                  <a:srgbClr val="7030A0"/>
+                </a:solidFill>
+              </a:ln>
+              <a:effectLst/>
+            </p:spPr>
+            <p:style>
+              <a:lnRef idx="1">
+                <a:schemeClr val="accent6"/>
+              </a:lnRef>
+              <a:fillRef idx="2">
+                <a:schemeClr val="accent6"/>
+              </a:fillRef>
+              <a:effectRef idx="1">
+                <a:schemeClr val="accent6"/>
+              </a:effectRef>
+              <a:fontRef idx="minor">
+                <a:schemeClr val="dk1"/>
+              </a:fontRef>
+            </p:style>
+            <p:txBody>
+              <a:bodyPr rtlCol="0" anchor="ctr"/>
+              <a:lstStyle/>
+              <a:p>
+                <a:pPr algn="ctr"/>
+                <a:endParaRPr lang="en-US" sz="1050"/>
+              </a:p>
+            </p:txBody>
+          </p:sp>
+          <p:sp>
+            <p:nvSpPr>
+              <p:cNvPr id="82" name="TextBox 81"/>
+              <p:cNvSpPr txBox="1"/>
+              <p:nvPr/>
+            </p:nvSpPr>
+            <p:spPr>
+              <a:xfrm>
+                <a:off x="2656370" y="3097917"/>
+                <a:ext cx="189257" cy="178683"/>
+              </a:xfrm>
+              <a:prstGeom prst="rect">
+                <a:avLst/>
+              </a:prstGeom>
+              <a:noFill/>
+            </p:spPr>
+            <p:txBody>
+              <a:bodyPr wrap="square" lIns="0" tIns="0" rIns="0" bIns="0" rtlCol="0">
+                <a:noAutofit/>
+              </a:bodyPr>
+              <a:lstStyle/>
+              <a:p>
+                <a:pPr algn="ctr"/>
+                <a:r>
+                  <a:rPr lang="en-US" sz="1100" dirty="0" smtClean="0">
+                    <a:solidFill>
+                      <a:srgbClr val="7030A0"/>
+                    </a:solidFill>
+                  </a:rPr>
+                  <a:t>1</a:t>
+                </a:r>
+                <a:endParaRPr lang="en-SG" sz="1100" dirty="0">
+                  <a:solidFill>
+                    <a:srgbClr val="7030A0"/>
+                  </a:solidFill>
+                </a:endParaRPr>
+              </a:p>
+            </p:txBody>
+          </p:sp>
+        </p:grpSp>
+        <p:sp>
+          <p:nvSpPr>
+            <p:cNvPr id="85" name="Rectangle 8"/>
+            <p:cNvSpPr/>
+            <p:nvPr/>
+          </p:nvSpPr>
+          <p:spPr>
+            <a:xfrm>
+              <a:off x="2868638" y="3281974"/>
+              <a:ext cx="1331591" cy="346760"/>
+            </a:xfrm>
+            <a:prstGeom prst="rect">
+              <a:avLst/>
+            </a:prstGeom>
+            <a:ln w="19050">
+              <a:solidFill>
+                <a:srgbClr val="7030A0"/>
+              </a:solidFill>
+            </a:ln>
+            <a:effectLst/>
+          </p:spPr>
+          <p:style>
+            <a:lnRef idx="1">
+              <a:schemeClr val="accent4"/>
+            </a:lnRef>
+            <a:fillRef idx="2">
+              <a:schemeClr val="accent4"/>
+            </a:fillRef>
+            <a:effectRef idx="1">
+              <a:schemeClr val="accent4"/>
+            </a:effectRef>
+            <a:fontRef idx="minor">
+              <a:schemeClr val="dk1"/>
+            </a:fontRef>
+          </p:style>
+          <p:txBody>
+            <a:bodyPr rtlCol="0" anchor="ctr"/>
+            <a:lstStyle/>
+            <a:p>
+              <a:pPr algn="ctr"/>
+              <a:r>
+                <a:rPr lang="en-US" sz="1050" dirty="0" err="1" smtClean="0">
+                  <a:solidFill>
+                    <a:srgbClr val="7030A0"/>
+                  </a:solidFill>
+                </a:rPr>
+                <a:t>TaskNotifierManager</a:t>
+              </a:r>
+              <a:endParaRPr lang="en-SG" sz="1050" dirty="0">
+                <a:solidFill>
+                  <a:srgbClr val="7030A0"/>
+                </a:solidFill>
+              </a:endParaRPr>
+            </a:p>
+          </p:txBody>
+        </p:sp>
+      </p:grpSp>
+      <p:sp>
+        <p:nvSpPr>
+          <p:cNvPr id="88" name="Isosceles Triangle 102"/>
+          <p:cNvSpPr/>
+          <p:nvPr/>
+        </p:nvSpPr>
+        <p:spPr>
+          <a:xfrm rot="16200000" flipV="1">
+            <a:off x="4905510" y="3927864"/>
+            <a:ext cx="270504" cy="175523"/>
+          </a:xfrm>
+          <a:prstGeom prst="triangle">
+            <a:avLst/>
+          </a:prstGeom>
+          <a:ln w="19050">
+            <a:solidFill>
+              <a:srgbClr val="7030A0"/>
+            </a:solidFill>
+          </a:ln>
+          <a:effectLst/>
+        </p:spPr>
+        <p:style>
+          <a:lnRef idx="1">
+            <a:schemeClr val="accent4"/>
+          </a:lnRef>
+          <a:fillRef idx="2">
+            <a:schemeClr val="accent4"/>
+          </a:fillRef>
+          <a:effectRef idx="1">
+            <a:schemeClr val="accent4"/>
+          </a:effectRef>
+          <a:fontRef idx="minor">
+            <a:schemeClr val="dk1"/>
+          </a:fontRef>
+        </p:style>
+        <p:txBody>
+          <a:bodyPr rtlCol="0" anchor="ctr"/>
+          <a:lstStyle/>
+          <a:p>
+            <a:pPr algn="ctr"/>
+            <a:endParaRPr lang="en-SG" sz="1050" b="1">
+              <a:solidFill>
+                <a:srgbClr val="92D050"/>
+              </a:solidFill>
+            </a:endParaRPr>
+          </a:p>
+        </p:txBody>
+      </p:sp>
+      <p:cxnSp>
+        <p:nvCxnSpPr>
+          <p:cNvPr id="89" name="Elbow Connector 63"/>
+          <p:cNvCxnSpPr>
+            <a:stCxn id="88" idx="3"/>
+          </p:cNvCxnSpPr>
+          <p:nvPr/>
+        </p:nvCxnSpPr>
+        <p:spPr>
+          <a:xfrm rot="10800000">
+            <a:off x="4230413" y="3475392"/>
+            <a:ext cx="722588" cy="540234"/>
+          </a:xfrm>
+          <a:prstGeom prst="bentConnector3">
+            <a:avLst>
+              <a:gd name="adj1" fmla="val 31546"/>
+            </a:avLst>
+          </a:prstGeom>
+          <a:ln w="19050">
+            <a:solidFill>
+              <a:srgbClr val="7030A0"/>
+            </a:solidFill>
+            <a:prstDash val="sysDot"/>
+            <a:headEnd type="none" w="med" len="med"/>
+            <a:tailEnd type="none" w="med" len="med"/>
+          </a:ln>
+          <a:effectLst/>
+        </p:spPr>
+        <p:style>
+          <a:lnRef idx="1">
+            <a:schemeClr val="accent2"/>
+          </a:lnRef>
+          <a:fillRef idx="2">
+            <a:schemeClr val="accent2"/>
+          </a:fillRef>
+          <a:effectRef idx="1">
+            <a:schemeClr val="accent2"/>
+          </a:effectRef>
+          <a:fontRef idx="minor">
+            <a:schemeClr val="dk1"/>
+          </a:fontRef>
+        </p:style>
+      </p:cxnSp>
+      <p:sp>
+        <p:nvSpPr>
+          <p:cNvPr id="90" name="Rectangle 8"/>
+          <p:cNvSpPr/>
+          <p:nvPr/>
+        </p:nvSpPr>
+        <p:spPr>
+          <a:xfrm>
+            <a:off x="5126379" y="3873800"/>
+            <a:ext cx="1158847" cy="346760"/>
+          </a:xfrm>
+          <a:prstGeom prst="rect">
+            <a:avLst/>
+          </a:prstGeom>
+          <a:ln w="19050">
+            <a:solidFill>
+              <a:srgbClr val="7030A0"/>
+            </a:solidFill>
+          </a:ln>
+          <a:effectLst/>
+        </p:spPr>
+        <p:style>
+          <a:lnRef idx="1">
+            <a:schemeClr val="accent4"/>
+          </a:lnRef>
+          <a:fillRef idx="2">
+            <a:schemeClr val="accent4"/>
+          </a:fillRef>
+          <a:effectRef idx="1">
+            <a:schemeClr val="accent4"/>
+          </a:effectRef>
+          <a:fontRef idx="minor">
+            <a:schemeClr val="dk1"/>
+          </a:fontRef>
+        </p:style>
+        <p:txBody>
+          <a:bodyPr rtlCol="0" anchor="ctr"/>
+          <a:lstStyle/>
+          <a:p>
+            <a:pPr algn="ctr"/>
+            <a:r>
+              <a:rPr lang="en-US" sz="1050" dirty="0" smtClean="0">
+                <a:solidFill>
+                  <a:srgbClr val="7030A0"/>
+                </a:solidFill>
+              </a:rPr>
+              <a:t>&lt;&lt;interface&gt;&gt;</a:t>
+            </a:r>
+          </a:p>
+          <a:p>
+            <a:pPr algn="ctr"/>
+            <a:r>
+              <a:rPr lang="en-US" sz="1050" dirty="0" err="1" smtClean="0">
+                <a:solidFill>
+                  <a:srgbClr val="7030A0"/>
+                </a:solidFill>
+              </a:rPr>
+              <a:t>TaskNotifier</a:t>
+            </a:r>
+            <a:endParaRPr lang="en-SG" sz="1050" dirty="0">
+              <a:solidFill>
+                <a:srgbClr val="7030A0"/>
+              </a:solidFill>
+            </a:endParaRPr>
+          </a:p>
+        </p:txBody>
+      </p:sp>
+      <p:cxnSp>
+        <p:nvCxnSpPr>
+          <p:cNvPr id="94" name="Straight Arrow Connector 93"/>
+          <p:cNvCxnSpPr>
+            <a:stCxn id="95" idx="3"/>
+          </p:cNvCxnSpPr>
+          <p:nvPr/>
+        </p:nvCxnSpPr>
+        <p:spPr>
+          <a:xfrm>
+            <a:off x="2647828" y="3868195"/>
+            <a:ext cx="220810" cy="5284"/>
+          </a:xfrm>
+          <a:prstGeom prst="straightConnector1">
+            <a:avLst/>
+          </a:prstGeom>
+          <a:ln w="19050">
+            <a:solidFill>
+              <a:srgbClr val="7030A0"/>
+            </a:solidFill>
+            <a:headEnd type="none" w="med" len="med"/>
+            <a:tailEnd type="arrow" w="med" len="med"/>
+          </a:ln>
+          <a:effectLst/>
+        </p:spPr>
+        <p:style>
+          <a:lnRef idx="1">
+            <a:schemeClr val="accent2"/>
+          </a:lnRef>
+          <a:fillRef idx="2">
+            <a:schemeClr val="accent2"/>
+          </a:fillRef>
+          <a:effectRef idx="1">
+            <a:schemeClr val="accent2"/>
+          </a:effectRef>
+          <a:fontRef idx="minor">
+            <a:schemeClr val="dk1"/>
+          </a:fontRef>
+        </p:style>
+      </p:cxnSp>
+      <p:sp>
+        <p:nvSpPr>
+          <p:cNvPr id="95" name="Flowchart: Decision 96"/>
+          <p:cNvSpPr/>
+          <p:nvPr/>
+        </p:nvSpPr>
+        <p:spPr>
+          <a:xfrm>
+            <a:off x="2411780" y="3781505"/>
+            <a:ext cx="236048" cy="173380"/>
+          </a:xfrm>
+          <a:prstGeom prst="flowChartDecision">
+            <a:avLst/>
+          </a:prstGeom>
+          <a:noFill/>
+          <a:ln w="19050">
+            <a:solidFill>
+              <a:srgbClr val="7030A0"/>
+            </a:solidFill>
+          </a:ln>
+          <a:effectLst/>
+        </p:spPr>
+        <p:style>
+          <a:lnRef idx="1">
+            <a:schemeClr val="accent6"/>
+          </a:lnRef>
+          <a:fillRef idx="2">
+            <a:schemeClr val="accent6"/>
+          </a:fillRef>
+          <a:effectRef idx="1">
+            <a:schemeClr val="accent6"/>
+          </a:effectRef>
+          <a:fontRef idx="minor">
+            <a:schemeClr val="dk1"/>
+          </a:fontRef>
+        </p:style>
+        <p:txBody>
+          <a:bodyPr rtlCol="0" anchor="ctr"/>
+          <a:lstStyle/>
+          <a:p>
+            <a:pPr algn="ctr"/>
+            <a:endParaRPr lang="en-US" sz="1050"/>
+          </a:p>
+        </p:txBody>
+      </p:sp>
+      <p:sp>
+        <p:nvSpPr>
+          <p:cNvPr id="96" name="TextBox 95"/>
           <p:cNvSpPr txBox="1"/>
           <p:nvPr/>
         </p:nvSpPr>
         <p:spPr>
           <a:xfrm>
-            <a:off x="6667770" y="3210194"/>
+            <a:off x="2647828" y="3927709"/>
             <a:ext cx="189257" cy="178683"/>
           </a:xfrm>
           <a:prstGeom prst="rect">
@@ -5812,6 +6240,172 @@
               <a:t>1</a:t>
             </a:r>
             <a:endParaRPr lang="en-SG" sz="1100" dirty="0">
+              <a:solidFill>
+                <a:srgbClr val="7030A0"/>
+              </a:solidFill>
+            </a:endParaRPr>
+          </a:p>
+        </p:txBody>
+      </p:sp>
+      <p:sp>
+        <p:nvSpPr>
+          <p:cNvPr id="93" name="Rectangle 8"/>
+          <p:cNvSpPr/>
+          <p:nvPr/>
+        </p:nvSpPr>
+        <p:spPr>
+          <a:xfrm>
+            <a:off x="2868638" y="3710679"/>
+            <a:ext cx="1686997" cy="346760"/>
+          </a:xfrm>
+          <a:prstGeom prst="rect">
+            <a:avLst/>
+          </a:prstGeom>
+          <a:ln w="19050">
+            <a:solidFill>
+              <a:srgbClr val="7030A0"/>
+            </a:solidFill>
+          </a:ln>
+          <a:effectLst/>
+        </p:spPr>
+        <p:style>
+          <a:lnRef idx="1">
+            <a:schemeClr val="accent4"/>
+          </a:lnRef>
+          <a:fillRef idx="2">
+            <a:schemeClr val="accent4"/>
+          </a:fillRef>
+          <a:effectRef idx="1">
+            <a:schemeClr val="accent4"/>
+          </a:effectRef>
+          <a:fontRef idx="minor">
+            <a:schemeClr val="dk1"/>
+          </a:fontRef>
+        </p:style>
+        <p:txBody>
+          <a:bodyPr rtlCol="0" anchor="ctr"/>
+          <a:lstStyle/>
+          <a:p>
+            <a:pPr algn="ctr"/>
+            <a:r>
+              <a:rPr lang="en-US" sz="1050" dirty="0" err="1" smtClean="0">
+                <a:solidFill>
+                  <a:srgbClr val="7030A0"/>
+                </a:solidFill>
+              </a:rPr>
+              <a:t>Task</a:t>
+            </a:r>
+            <a:r>
+              <a:rPr lang="en-US" sz="1050" dirty="0" err="1" smtClean="0">
+                <a:solidFill>
+                  <a:srgbClr val="7030A0"/>
+                </a:solidFill>
+              </a:rPr>
+              <a:t>ManagerStateManager</a:t>
+            </a:r>
+            <a:endParaRPr lang="en-SG" sz="1050" dirty="0">
+              <a:solidFill>
+                <a:srgbClr val="7030A0"/>
+              </a:solidFill>
+            </a:endParaRPr>
+          </a:p>
+        </p:txBody>
+      </p:sp>
+      <p:cxnSp>
+        <p:nvCxnSpPr>
+          <p:cNvPr id="101" name="Straight Arrow Connector 100"/>
+          <p:cNvCxnSpPr/>
+          <p:nvPr/>
+        </p:nvCxnSpPr>
+        <p:spPr>
+          <a:xfrm flipH="1">
+            <a:off x="3575309" y="4069431"/>
+            <a:ext cx="2620" cy="201267"/>
+          </a:xfrm>
+          <a:prstGeom prst="straightConnector1">
+            <a:avLst/>
+          </a:prstGeom>
+          <a:ln w="19050">
+            <a:solidFill>
+              <a:srgbClr val="7030A0"/>
+            </a:solidFill>
+            <a:headEnd type="none" w="med" len="med"/>
+            <a:tailEnd type="arrow" w="med" len="med"/>
+          </a:ln>
+          <a:effectLst/>
+        </p:spPr>
+        <p:style>
+          <a:lnRef idx="1">
+            <a:schemeClr val="accent2"/>
+          </a:lnRef>
+          <a:fillRef idx="2">
+            <a:schemeClr val="accent2"/>
+          </a:fillRef>
+          <a:effectRef idx="1">
+            <a:schemeClr val="accent2"/>
+          </a:effectRef>
+          <a:fontRef idx="minor">
+            <a:schemeClr val="dk1"/>
+          </a:fontRef>
+        </p:style>
+      </p:cxnSp>
+      <p:sp>
+        <p:nvSpPr>
+          <p:cNvPr id="103" name="Rectangle 8"/>
+          <p:cNvSpPr/>
+          <p:nvPr/>
+        </p:nvSpPr>
+        <p:spPr>
+          <a:xfrm>
+            <a:off x="2945374" y="4273956"/>
+            <a:ext cx="1344908" cy="292138"/>
+          </a:xfrm>
+          <a:prstGeom prst="rect">
+            <a:avLst/>
+          </a:prstGeom>
+          <a:ln w="19050">
+            <a:solidFill>
+              <a:srgbClr val="7030A0"/>
+            </a:solidFill>
+          </a:ln>
+          <a:effectLst/>
+        </p:spPr>
+        <p:style>
+          <a:lnRef idx="1">
+            <a:schemeClr val="accent4"/>
+          </a:lnRef>
+          <a:fillRef idx="2">
+            <a:schemeClr val="accent4"/>
+          </a:fillRef>
+          <a:effectRef idx="1">
+            <a:schemeClr val="accent4"/>
+          </a:effectRef>
+          <a:fontRef idx="minor">
+            <a:schemeClr val="dk1"/>
+          </a:fontRef>
+        </p:style>
+        <p:txBody>
+          <a:bodyPr rtlCol="0" anchor="ctr"/>
+          <a:lstStyle/>
+          <a:p>
+            <a:pPr algn="ctr"/>
+            <a:r>
+              <a:rPr lang="en-US" sz="1050" dirty="0" err="1" smtClean="0">
+                <a:solidFill>
+                  <a:srgbClr val="7030A0"/>
+                </a:solidFill>
+              </a:rPr>
+              <a:t>Task</a:t>
+            </a:r>
+            <a:r>
+              <a:rPr lang="en-US" sz="1050" dirty="0" err="1" smtClean="0">
+                <a:solidFill>
+                  <a:srgbClr val="7030A0"/>
+                </a:solidFill>
+              </a:rPr>
+              <a:t>ManagerState</a:t>
+            </a:r>
+            <a:endParaRPr lang="en-SG" sz="1050" dirty="0">
               <a:solidFill>
                 <a:srgbClr val="7030A0"/>
               </a:solidFill>

</xml_diff>